<commit_message>
added basic reactive form component
</commit_message>
<xml_diff>
--- a/Reactive forms.pptx
+++ b/Reactive forms.pptx
@@ -9,9 +9,11 @@
     <p:sldId id="257" r:id="rId3"/>
     <p:sldId id="258" r:id="rId4"/>
     <p:sldId id="260" r:id="rId5"/>
-    <p:sldId id="261" r:id="rId6"/>
-    <p:sldId id="262" r:id="rId7"/>
-    <p:sldId id="263" r:id="rId8"/>
+    <p:sldId id="264" r:id="rId6"/>
+    <p:sldId id="261" r:id="rId7"/>
+    <p:sldId id="262" r:id="rId8"/>
+    <p:sldId id="263" r:id="rId9"/>
+    <p:sldId id="265" r:id="rId10"/>
   </p:sldIdLst>
   <p:sldSz cx="12192000" cy="6858000"/>
   <p:notesSz cx="6858000" cy="9144000"/>
@@ -289,7 +291,7 @@
           <a:p>
             <a:fld id="{48A87A34-81AB-432B-8DAE-1953F412C126}" type="datetimeFigureOut">
               <a:rPr lang="en-US" dirty="0"/>
-              <a:t>8/6/2021</a:t>
+              <a:t>9/14/2021</a:t>
             </a:fld>
             <a:endParaRPr lang="en-US" dirty="0"/>
           </a:p>
@@ -599,7 +601,7 @@
           <a:p>
             <a:fld id="{48A87A34-81AB-432B-8DAE-1953F412C126}" type="datetimeFigureOut">
               <a:rPr lang="en-US" dirty="0"/>
-              <a:t>8/6/2021</a:t>
+              <a:t>9/14/2021</a:t>
             </a:fld>
             <a:endParaRPr lang="en-US" dirty="0"/>
           </a:p>
@@ -816,7 +818,7 @@
           <a:p>
             <a:fld id="{48A87A34-81AB-432B-8DAE-1953F412C126}" type="datetimeFigureOut">
               <a:rPr lang="en-US" dirty="0"/>
-              <a:t>8/6/2021</a:t>
+              <a:t>9/14/2021</a:t>
             </a:fld>
             <a:endParaRPr lang="en-US" dirty="0"/>
           </a:p>
@@ -1102,7 +1104,7 @@
           <a:p>
             <a:fld id="{48A87A34-81AB-432B-8DAE-1953F412C126}" type="datetimeFigureOut">
               <a:rPr lang="en-US" dirty="0"/>
-              <a:t>8/6/2021</a:t>
+              <a:t>9/14/2021</a:t>
             </a:fld>
             <a:endParaRPr lang="en-US" dirty="0"/>
           </a:p>
@@ -1551,7 +1553,7 @@
           <a:p>
             <a:fld id="{48A87A34-81AB-432B-8DAE-1953F412C126}" type="datetimeFigureOut">
               <a:rPr lang="en-US" dirty="0"/>
-              <a:t>8/6/2021</a:t>
+              <a:t>9/14/2021</a:t>
             </a:fld>
             <a:endParaRPr lang="en-US" dirty="0"/>
           </a:p>
@@ -2122,7 +2124,7 @@
           <a:p>
             <a:fld id="{48A87A34-81AB-432B-8DAE-1953F412C126}" type="datetimeFigureOut">
               <a:rPr lang="en-US" dirty="0"/>
-              <a:t>8/6/2021</a:t>
+              <a:t>9/14/2021</a:t>
             </a:fld>
             <a:endParaRPr lang="en-US" dirty="0"/>
           </a:p>
@@ -2978,7 +2980,7 @@
           <a:p>
             <a:fld id="{48A87A34-81AB-432B-8DAE-1953F412C126}" type="datetimeFigureOut">
               <a:rPr lang="en-US" dirty="0"/>
-              <a:t>8/6/2021</a:t>
+              <a:t>9/14/2021</a:t>
             </a:fld>
             <a:endParaRPr lang="en-US" dirty="0"/>
           </a:p>
@@ -3178,7 +3180,7 @@
           <a:p>
             <a:fld id="{48A87A34-81AB-432B-8DAE-1953F412C126}" type="datetimeFigureOut">
               <a:rPr lang="en-US" dirty="0"/>
-              <a:t>8/6/2021</a:t>
+              <a:t>9/14/2021</a:t>
             </a:fld>
             <a:endParaRPr lang="en-US" dirty="0"/>
           </a:p>
@@ -3387,7 +3389,7 @@
           <a:p>
             <a:fld id="{48A87A34-81AB-432B-8DAE-1953F412C126}" type="datetimeFigureOut">
               <a:rPr lang="en-US" dirty="0"/>
-              <a:t>8/6/2021</a:t>
+              <a:t>9/14/2021</a:t>
             </a:fld>
             <a:endParaRPr lang="en-US" dirty="0"/>
           </a:p>
@@ -3587,7 +3589,7 @@
           <a:p>
             <a:fld id="{48A87A34-81AB-432B-8DAE-1953F412C126}" type="datetimeFigureOut">
               <a:rPr lang="en-US" dirty="0"/>
-              <a:t>8/6/2021</a:t>
+              <a:t>9/14/2021</a:t>
             </a:fld>
             <a:endParaRPr lang="en-US" dirty="0"/>
           </a:p>
@@ -3862,7 +3864,7 @@
           <a:p>
             <a:fld id="{48A87A34-81AB-432B-8DAE-1953F412C126}" type="datetimeFigureOut">
               <a:rPr lang="en-US" dirty="0"/>
-              <a:t>8/6/2021</a:t>
+              <a:t>9/14/2021</a:t>
             </a:fld>
             <a:endParaRPr lang="en-US" dirty="0"/>
           </a:p>
@@ -4124,7 +4126,7 @@
           <a:p>
             <a:fld id="{48A87A34-81AB-432B-8DAE-1953F412C126}" type="datetimeFigureOut">
               <a:rPr lang="en-US" dirty="0"/>
-              <a:t>8/6/2021</a:t>
+              <a:t>9/14/2021</a:t>
             </a:fld>
             <a:endParaRPr lang="en-US" dirty="0"/>
           </a:p>
@@ -4534,7 +4536,7 @@
           <a:p>
             <a:fld id="{48A87A34-81AB-432B-8DAE-1953F412C126}" type="datetimeFigureOut">
               <a:rPr lang="en-US" dirty="0"/>
-              <a:t>8/6/2021</a:t>
+              <a:t>9/14/2021</a:t>
             </a:fld>
             <a:endParaRPr lang="en-US" dirty="0"/>
           </a:p>
@@ -4677,7 +4679,7 @@
           <a:p>
             <a:fld id="{48A87A34-81AB-432B-8DAE-1953F412C126}" type="datetimeFigureOut">
               <a:rPr lang="en-US" dirty="0"/>
-              <a:t>8/6/2021</a:t>
+              <a:t>9/14/2021</a:t>
             </a:fld>
             <a:endParaRPr lang="en-US" dirty="0"/>
           </a:p>
@@ -4797,7 +4799,7 @@
           <a:p>
             <a:fld id="{48A87A34-81AB-432B-8DAE-1953F412C126}" type="datetimeFigureOut">
               <a:rPr lang="en-US" dirty="0"/>
-              <a:t>8/6/2021</a:t>
+              <a:t>9/14/2021</a:t>
             </a:fld>
             <a:endParaRPr lang="en-US" dirty="0"/>
           </a:p>
@@ -5071,7 +5073,7 @@
           <a:p>
             <a:fld id="{48A87A34-81AB-432B-8DAE-1953F412C126}" type="datetimeFigureOut">
               <a:rPr lang="en-US" dirty="0"/>
-              <a:t>8/6/2021</a:t>
+              <a:t>9/14/2021</a:t>
             </a:fld>
             <a:endParaRPr lang="en-US" dirty="0"/>
           </a:p>
@@ -5381,7 +5383,7 @@
           <a:p>
             <a:fld id="{48A87A34-81AB-432B-8DAE-1953F412C126}" type="datetimeFigureOut">
               <a:rPr lang="en-US" dirty="0"/>
-              <a:t>8/6/2021</a:t>
+              <a:t>9/14/2021</a:t>
             </a:fld>
             <a:endParaRPr lang="en-US" dirty="0"/>
           </a:p>
@@ -5630,7 +5632,7 @@
             <a:fld id="{48A87A34-81AB-432B-8DAE-1953F412C126}" type="datetimeFigureOut">
               <a:rPr lang="en-US" dirty="0"/>
               <a:pPr/>
-              <a:t>8/6/2021</a:t>
+              <a:t>9/14/2021</a:t>
             </a:fld>
             <a:endParaRPr lang="en-US" dirty="0"/>
           </a:p>
@@ -8475,6 +8477,164 @@
           <p:cNvPr id="2" name="Title 1">
             <a:extLst>
               <a:ext uri="{FF2B5EF4-FFF2-40B4-BE49-F238E27FC236}">
+                <a16:creationId xmlns:a16="http://schemas.microsoft.com/office/drawing/2014/main" id="{1A579E15-5AE6-4F82-B74B-CEA9B19C10BF}"/>
+              </a:ext>
+            </a:extLst>
+          </p:cNvPr>
+          <p:cNvSpPr>
+            <a:spLocks noGrp="1"/>
+          </p:cNvSpPr>
+          <p:nvPr>
+            <p:ph type="title"/>
+          </p:nvPr>
+        </p:nvSpPr>
+        <p:spPr/>
+        <p:txBody>
+          <a:bodyPr/>
+          <a:lstStyle/>
+          <a:p>
+            <a:r>
+              <a:rPr lang="en-US" dirty="0"/>
+              <a:t>Basic Building blocks</a:t>
+            </a:r>
+            <a:endParaRPr lang="en-IN" dirty="0"/>
+          </a:p>
+        </p:txBody>
+      </p:sp>
+      <p:sp>
+        <p:nvSpPr>
+          <p:cNvPr id="3" name="Content Placeholder 2">
+            <a:extLst>
+              <a:ext uri="{FF2B5EF4-FFF2-40B4-BE49-F238E27FC236}">
+                <a16:creationId xmlns:a16="http://schemas.microsoft.com/office/drawing/2014/main" id="{4145E8D1-B17F-491F-95AF-490050989572}"/>
+              </a:ext>
+            </a:extLst>
+          </p:cNvPr>
+          <p:cNvSpPr>
+            <a:spLocks noGrp="1"/>
+          </p:cNvSpPr>
+          <p:nvPr>
+            <p:ph sz="quarter" idx="13"/>
+          </p:nvPr>
+        </p:nvSpPr>
+        <p:spPr/>
+        <p:txBody>
+          <a:bodyPr/>
+          <a:lstStyle/>
+          <a:p>
+            <a:r>
+              <a:rPr lang="en-US" dirty="0"/>
+              <a:t>Form group</a:t>
+            </a:r>
+          </a:p>
+          <a:p>
+            <a:pPr lvl="1"/>
+            <a:r>
+              <a:rPr lang="en-US" dirty="0"/>
+              <a:t>The </a:t>
+            </a:r>
+            <a:r>
+              <a:rPr lang="en-US" dirty="0" err="1"/>
+              <a:t>FormGroup</a:t>
+            </a:r>
+            <a:r>
+              <a:rPr lang="en-US" dirty="0"/>
+              <a:t> is a collection of </a:t>
+            </a:r>
+            <a:r>
+              <a:rPr lang="en-US" dirty="0" err="1"/>
+              <a:t>FormControl</a:t>
+            </a:r>
+            <a:r>
+              <a:rPr lang="en-US" dirty="0"/>
+              <a:t>. It can also contain other </a:t>
+            </a:r>
+            <a:r>
+              <a:rPr lang="en-US" dirty="0" err="1"/>
+              <a:t>FormGroup’s</a:t>
+            </a:r>
+            <a:r>
+              <a:rPr lang="en-US" dirty="0"/>
+              <a:t>.</a:t>
+            </a:r>
+            <a:endParaRPr lang="en-IN" dirty="0"/>
+          </a:p>
+          <a:p>
+            <a:r>
+              <a:rPr lang="en-US" dirty="0"/>
+              <a:t>Form Control</a:t>
+            </a:r>
+          </a:p>
+          <a:p>
+            <a:pPr lvl="1"/>
+            <a:r>
+              <a:rPr lang="en-US" dirty="0"/>
+              <a:t>The </a:t>
+            </a:r>
+            <a:r>
+              <a:rPr lang="en-US" dirty="0" err="1"/>
+              <a:t>FormControl</a:t>
+            </a:r>
+            <a:r>
+              <a:rPr lang="en-US" dirty="0"/>
+              <a:t> is the basic building block of the Angular Forms. It represents a single input field in an Angular form.</a:t>
+            </a:r>
+          </a:p>
+          <a:p>
+            <a:r>
+              <a:rPr lang="en-US" dirty="0"/>
+              <a:t>Validators</a:t>
+            </a:r>
+          </a:p>
+          <a:p>
+            <a:pPr lvl="1"/>
+            <a:r>
+              <a:rPr lang="en-US" dirty="0"/>
+              <a:t>In built</a:t>
+            </a:r>
+            <a:r>
+              <a:rPr lang="en-US"/>
+              <a:t>/ Custom</a:t>
+            </a:r>
+            <a:endParaRPr lang="en-US" dirty="0"/>
+          </a:p>
+        </p:txBody>
+      </p:sp>
+    </p:spTree>
+    <p:extLst>
+      <p:ext uri="{BB962C8B-B14F-4D97-AF65-F5344CB8AC3E}">
+        <p14:creationId xmlns:p14="http://schemas.microsoft.com/office/powerpoint/2010/main" val="3691209870"/>
+      </p:ext>
+    </p:extLst>
+  </p:cSld>
+  <p:clrMapOvr>
+    <a:masterClrMapping/>
+  </p:clrMapOvr>
+</p:sld>
+</file>
+
+<file path=ppt/slides/slide6.xml><?xml version="1.0" encoding="utf-8"?>
+<p:sld xmlns:a="http://schemas.openxmlformats.org/drawingml/2006/main" xmlns:r="http://schemas.openxmlformats.org/officeDocument/2006/relationships" xmlns:p="http://schemas.openxmlformats.org/presentationml/2006/main">
+  <p:cSld>
+    <p:spTree>
+      <p:nvGrpSpPr>
+        <p:cNvPr id="1" name=""/>
+        <p:cNvGrpSpPr/>
+        <p:nvPr/>
+      </p:nvGrpSpPr>
+      <p:grpSpPr>
+        <a:xfrm>
+          <a:off x="0" y="0"/>
+          <a:ext cx="0" cy="0"/>
+          <a:chOff x="0" y="0"/>
+          <a:chExt cx="0" cy="0"/>
+        </a:xfrm>
+      </p:grpSpPr>
+      <p:sp>
+        <p:nvSpPr>
+          <p:cNvPr id="2" name="Title 1">
+            <a:extLst>
+              <a:ext uri="{FF2B5EF4-FFF2-40B4-BE49-F238E27FC236}">
                 <a16:creationId xmlns:a16="http://schemas.microsoft.com/office/drawing/2014/main" id="{12615154-35DF-4434-B00B-F7C824D07502}"/>
               </a:ext>
             </a:extLst>
@@ -8528,7 +8688,7 @@
         </p:spPr>
         <p:txBody>
           <a:bodyPr>
-            <a:normAutofit lnSpcReduction="10000"/>
+            <a:normAutofit fontScale="92500" lnSpcReduction="20000"/>
           </a:bodyPr>
           <a:lstStyle/>
           <a:p>
@@ -8667,6 +8827,36 @@
                 <a:latin typeface="-apple-system"/>
               </a:rPr>
               <a:t>&lt;form #contactForm="ngForm“ ….</a:t>
+            </a:r>
+          </a:p>
+          <a:p>
+            <a:pPr lvl="2"/>
+            <a:r>
+              <a:rPr lang="en-US" cap="none" dirty="0">
+                <a:solidFill>
+                  <a:srgbClr val="000000"/>
+                </a:solidFill>
+                <a:latin typeface="-apple-system"/>
+              </a:rPr>
+              <a:t>Creates a top-level </a:t>
+            </a:r>
+            <a:r>
+              <a:rPr lang="en-US" cap="none" dirty="0" err="1">
+                <a:solidFill>
+                  <a:srgbClr val="000000"/>
+                </a:solidFill>
+                <a:latin typeface="-apple-system"/>
+              </a:rPr>
+              <a:t>FormGroup</a:t>
+            </a:r>
+            <a:r>
+              <a:rPr lang="en-US" cap="none" dirty="0">
+                <a:solidFill>
+                  <a:srgbClr val="000000"/>
+                </a:solidFill>
+                <a:latin typeface="-apple-system"/>
+              </a:rPr>
+              <a:t> instance</a:t>
             </a:r>
           </a:p>
           <a:p>
@@ -8839,7 +9029,7 @@
 </p:sld>
 </file>
 
-<file path=ppt/slides/slide6.xml><?xml version="1.0" encoding="utf-8"?>
+<file path=ppt/slides/slide7.xml><?xml version="1.0" encoding="utf-8"?>
 <p:sld xmlns:a="http://schemas.openxmlformats.org/drawingml/2006/main" xmlns:r="http://schemas.openxmlformats.org/officeDocument/2006/relationships" xmlns:p="http://schemas.openxmlformats.org/presentationml/2006/main">
   <p:cSld>
     <p:spTree>
@@ -9884,7 +10074,7 @@
 </p:sld>
 </file>
 
-<file path=ppt/slides/slide7.xml><?xml version="1.0" encoding="utf-8"?>
+<file path=ppt/slides/slide8.xml><?xml version="1.0" encoding="utf-8"?>
 <p:sld xmlns:a="http://schemas.openxmlformats.org/drawingml/2006/main" xmlns:r="http://schemas.openxmlformats.org/officeDocument/2006/relationships" xmlns:p="http://schemas.openxmlformats.org/presentationml/2006/main">
   <p:cSld>
     <p:spTree>
@@ -9935,6 +10125,322 @@
     <p:extLst>
       <p:ext uri="{BB962C8B-B14F-4D97-AF65-F5344CB8AC3E}">
         <p14:creationId xmlns:p14="http://schemas.microsoft.com/office/powerpoint/2010/main" val="499115378"/>
+      </p:ext>
+    </p:extLst>
+  </p:cSld>
+  <p:clrMapOvr>
+    <a:masterClrMapping/>
+  </p:clrMapOvr>
+</p:sld>
+</file>
+
+<file path=ppt/slides/slide9.xml><?xml version="1.0" encoding="utf-8"?>
+<p:sld xmlns:a="http://schemas.openxmlformats.org/drawingml/2006/main" xmlns:r="http://schemas.openxmlformats.org/officeDocument/2006/relationships" xmlns:p="http://schemas.openxmlformats.org/presentationml/2006/main">
+  <p:cSld>
+    <p:spTree>
+      <p:nvGrpSpPr>
+        <p:cNvPr id="1" name=""/>
+        <p:cNvGrpSpPr/>
+        <p:nvPr/>
+      </p:nvGrpSpPr>
+      <p:grpSpPr>
+        <a:xfrm>
+          <a:off x="0" y="0"/>
+          <a:ext cx="0" cy="0"/>
+          <a:chOff x="0" y="0"/>
+          <a:chExt cx="0" cy="0"/>
+        </a:xfrm>
+      </p:grpSpPr>
+      <p:sp>
+        <p:nvSpPr>
+          <p:cNvPr id="2" name="Title 1">
+            <a:extLst>
+              <a:ext uri="{FF2B5EF4-FFF2-40B4-BE49-F238E27FC236}">
+                <a16:creationId xmlns:a16="http://schemas.microsoft.com/office/drawing/2014/main" id="{12615154-35DF-4434-B00B-F7C824D07502}"/>
+              </a:ext>
+            </a:extLst>
+          </p:cNvPr>
+          <p:cNvSpPr>
+            <a:spLocks noGrp="1"/>
+          </p:cNvSpPr>
+          <p:nvPr>
+            <p:ph type="title"/>
+          </p:nvPr>
+        </p:nvSpPr>
+        <p:spPr>
+          <a:xfrm>
+            <a:off x="913774" y="161315"/>
+            <a:ext cx="10364451" cy="1596177"/>
+          </a:xfrm>
+        </p:spPr>
+        <p:txBody>
+          <a:bodyPr/>
+          <a:lstStyle/>
+          <a:p>
+            <a:r>
+              <a:rPr lang="en-US" dirty="0"/>
+              <a:t>Working with Reactive forms</a:t>
+            </a:r>
+            <a:endParaRPr lang="en-IN" dirty="0"/>
+          </a:p>
+        </p:txBody>
+      </p:sp>
+      <p:sp>
+        <p:nvSpPr>
+          <p:cNvPr id="3" name="Content Placeholder 2">
+            <a:extLst>
+              <a:ext uri="{FF2B5EF4-FFF2-40B4-BE49-F238E27FC236}">
+                <a16:creationId xmlns:a16="http://schemas.microsoft.com/office/drawing/2014/main" id="{AB6E4F1C-5942-4BC4-9E09-80B003D54DAC}"/>
+              </a:ext>
+            </a:extLst>
+          </p:cNvPr>
+          <p:cNvSpPr>
+            <a:spLocks noGrp="1"/>
+          </p:cNvSpPr>
+          <p:nvPr>
+            <p:ph sz="quarter" idx="13"/>
+          </p:nvPr>
+        </p:nvSpPr>
+        <p:spPr>
+          <a:xfrm>
+            <a:off x="913774" y="1757492"/>
+            <a:ext cx="10363826" cy="4169175"/>
+          </a:xfrm>
+        </p:spPr>
+        <p:txBody>
+          <a:bodyPr>
+            <a:normAutofit/>
+          </a:bodyPr>
+          <a:lstStyle/>
+          <a:p>
+            <a:r>
+              <a:rPr lang="en-IN" b="1" i="0" dirty="0">
+                <a:solidFill>
+                  <a:srgbClr val="000000"/>
+                </a:solidFill>
+                <a:effectLst/>
+                <a:latin typeface="-apple-system"/>
+              </a:rPr>
+              <a:t>Import Forms Module</a:t>
+            </a:r>
+          </a:p>
+          <a:p>
+            <a:pPr marL="685800" lvl="2">
+              <a:spcBef>
+                <a:spcPts val="1000"/>
+              </a:spcBef>
+            </a:pPr>
+            <a:r>
+              <a:rPr lang="en-US" cap="none" dirty="0">
+                <a:solidFill>
+                  <a:srgbClr val="000000"/>
+                </a:solidFill>
+                <a:latin typeface="-apple-system"/>
+              </a:rPr>
+              <a:t>import { </a:t>
+            </a:r>
+            <a:r>
+              <a:rPr lang="en-US" cap="none" dirty="0" err="1">
+                <a:solidFill>
+                  <a:srgbClr val="000000"/>
+                </a:solidFill>
+                <a:latin typeface="-apple-system"/>
+              </a:rPr>
+              <a:t>ReactiveFormsModule</a:t>
+            </a:r>
+            <a:r>
+              <a:rPr lang="en-US" cap="none" dirty="0">
+                <a:solidFill>
+                  <a:srgbClr val="000000"/>
+                </a:solidFill>
+                <a:latin typeface="-apple-system"/>
+              </a:rPr>
+              <a:t> } from '@angular/forms';</a:t>
+            </a:r>
+            <a:r>
+              <a:rPr lang="en-IN" cap="none" dirty="0">
+                <a:solidFill>
+                  <a:srgbClr val="000000"/>
+                </a:solidFill>
+                <a:latin typeface="-apple-system"/>
+              </a:rPr>
+              <a:t>imports: [</a:t>
+            </a:r>
+          </a:p>
+          <a:p>
+            <a:pPr marL="457200" lvl="1" indent="0">
+              <a:buNone/>
+            </a:pPr>
+            <a:r>
+              <a:rPr lang="en-IN" sz="1600" cap="none" dirty="0">
+                <a:solidFill>
+                  <a:srgbClr val="000000"/>
+                </a:solidFill>
+                <a:latin typeface="-apple-system"/>
+              </a:rPr>
+              <a:t>	   …..</a:t>
+            </a:r>
+          </a:p>
+          <a:p>
+            <a:pPr marL="457200" lvl="1" indent="0">
+              <a:buNone/>
+            </a:pPr>
+            <a:r>
+              <a:rPr lang="en-IN" sz="1600" cap="none" dirty="0">
+                <a:solidFill>
+                  <a:srgbClr val="000000"/>
+                </a:solidFill>
+                <a:latin typeface="-apple-system"/>
+              </a:rPr>
+              <a:t>	  </a:t>
+            </a:r>
+            <a:r>
+              <a:rPr lang="en-US" sz="1800" cap="none" dirty="0">
+                <a:solidFill>
+                  <a:srgbClr val="000000"/>
+                </a:solidFill>
+                <a:latin typeface="-apple-system"/>
+              </a:rPr>
+              <a:t> </a:t>
+            </a:r>
+            <a:r>
+              <a:rPr lang="en-US" sz="1800" cap="none" dirty="0" err="1">
+                <a:solidFill>
+                  <a:srgbClr val="000000"/>
+                </a:solidFill>
+                <a:latin typeface="-apple-system"/>
+              </a:rPr>
+              <a:t>ReactiveFormsModule</a:t>
+            </a:r>
+            <a:endParaRPr lang="en-IN" sz="1600" cap="none" dirty="0">
+              <a:solidFill>
+                <a:srgbClr val="000000"/>
+              </a:solidFill>
+              <a:latin typeface="-apple-system"/>
+            </a:endParaRPr>
+          </a:p>
+          <a:p>
+            <a:pPr marL="457200" lvl="1" indent="0">
+              <a:buNone/>
+            </a:pPr>
+            <a:r>
+              <a:rPr lang="en-IN" sz="1600" cap="none" dirty="0">
+                <a:solidFill>
+                  <a:srgbClr val="000000"/>
+                </a:solidFill>
+                <a:latin typeface="-apple-system"/>
+              </a:rPr>
+              <a:t>	],</a:t>
+            </a:r>
+          </a:p>
+          <a:p>
+            <a:pPr lvl="1"/>
+            <a:r>
+              <a:rPr lang="en-IN" sz="1200" b="1" cap="none" dirty="0" err="1">
+                <a:solidFill>
+                  <a:srgbClr val="000000"/>
+                </a:solidFill>
+                <a:latin typeface="-apple-system"/>
+              </a:rPr>
+              <a:t>FormGroup</a:t>
+            </a:r>
+            <a:endParaRPr lang="en-IN" sz="1200" b="1" cap="none" dirty="0">
+              <a:solidFill>
+                <a:srgbClr val="000000"/>
+              </a:solidFill>
+              <a:latin typeface="-apple-system"/>
+            </a:endParaRPr>
+          </a:p>
+          <a:p>
+            <a:pPr lvl="2"/>
+            <a:r>
+              <a:rPr lang="en-US" sz="1200" cap="none" dirty="0">
+                <a:solidFill>
+                  <a:srgbClr val="000000"/>
+                </a:solidFill>
+                <a:latin typeface="-apple-system"/>
+              </a:rPr>
+              <a:t>represents a collection of form Controls</a:t>
+            </a:r>
+            <a:endParaRPr lang="en-IN" sz="1200" cap="none" dirty="0">
+              <a:solidFill>
+                <a:srgbClr val="000000"/>
+              </a:solidFill>
+              <a:latin typeface="-apple-system"/>
+            </a:endParaRPr>
+          </a:p>
+          <a:p>
+            <a:pPr lvl="1"/>
+            <a:r>
+              <a:rPr lang="en-IN" sz="1200" b="1" cap="none" dirty="0" err="1">
+                <a:solidFill>
+                  <a:srgbClr val="000000"/>
+                </a:solidFill>
+                <a:latin typeface="-apple-system"/>
+              </a:rPr>
+              <a:t>FormControl</a:t>
+            </a:r>
+            <a:endParaRPr lang="en-IN" sz="1200" b="1" cap="none" dirty="0">
+              <a:solidFill>
+                <a:srgbClr val="000000"/>
+              </a:solidFill>
+              <a:latin typeface="-apple-system"/>
+            </a:endParaRPr>
+          </a:p>
+          <a:p>
+            <a:pPr lvl="2"/>
+            <a:r>
+              <a:rPr lang="en-US" sz="1200" cap="none" dirty="0">
+                <a:solidFill>
+                  <a:srgbClr val="000000"/>
+                </a:solidFill>
+                <a:latin typeface="-apple-system"/>
+              </a:rPr>
+              <a:t>Encapsulates the state of a single form element in our form</a:t>
+            </a:r>
+            <a:endParaRPr lang="en-IN" sz="1200" cap="none" dirty="0">
+              <a:solidFill>
+                <a:srgbClr val="000000"/>
+              </a:solidFill>
+              <a:latin typeface="-apple-system"/>
+            </a:endParaRPr>
+          </a:p>
+          <a:p>
+            <a:pPr lvl="2"/>
+            <a:endParaRPr lang="en-IN" sz="1200" b="1" i="0" dirty="0">
+              <a:solidFill>
+                <a:srgbClr val="000000"/>
+              </a:solidFill>
+              <a:effectLst/>
+              <a:latin typeface="-apple-system"/>
+            </a:endParaRPr>
+          </a:p>
+          <a:p>
+            <a:pPr lvl="1"/>
+            <a:endParaRPr lang="en-IN" sz="1400" cap="none" dirty="0">
+              <a:solidFill>
+                <a:srgbClr val="000000"/>
+              </a:solidFill>
+              <a:latin typeface="-apple-system"/>
+            </a:endParaRPr>
+          </a:p>
+          <a:p>
+            <a:pPr marL="457200" lvl="1" indent="0">
+              <a:buNone/>
+            </a:pPr>
+            <a:endParaRPr lang="en-IN" sz="1600" cap="none" dirty="0">
+              <a:solidFill>
+                <a:srgbClr val="000000"/>
+              </a:solidFill>
+              <a:latin typeface="-apple-system"/>
+            </a:endParaRPr>
+          </a:p>
+        </p:txBody>
+      </p:sp>
+    </p:spTree>
+    <p:extLst>
+      <p:ext uri="{BB962C8B-B14F-4D97-AF65-F5344CB8AC3E}">
+        <p14:creationId xmlns:p14="http://schemas.microsoft.com/office/powerpoint/2010/main" val="3044868461"/>
       </p:ext>
     </p:extLst>
   </p:cSld>

</xml_diff>

<commit_message>
added ppt slides for both template and reacive basics
</commit_message>
<xml_diff>
--- a/Reactive forms.pptx
+++ b/Reactive forms.pptx
@@ -11,9 +11,12 @@
     <p:sldId id="260" r:id="rId5"/>
     <p:sldId id="264" r:id="rId6"/>
     <p:sldId id="261" r:id="rId7"/>
-    <p:sldId id="262" r:id="rId8"/>
+    <p:sldId id="266" r:id="rId8"/>
     <p:sldId id="263" r:id="rId9"/>
     <p:sldId id="265" r:id="rId10"/>
+    <p:sldId id="267" r:id="rId11"/>
+    <p:sldId id="268" r:id="rId12"/>
+    <p:sldId id="269" r:id="rId13"/>
   </p:sldIdLst>
   <p:sldSz cx="12192000" cy="6858000"/>
   <p:notesSz cx="6858000" cy="9144000"/>
@@ -291,7 +294,7 @@
           <a:p>
             <a:fld id="{48A87A34-81AB-432B-8DAE-1953F412C126}" type="datetimeFigureOut">
               <a:rPr lang="en-US" dirty="0"/>
-              <a:t>9/14/2021</a:t>
+              <a:t>9/18/2021</a:t>
             </a:fld>
             <a:endParaRPr lang="en-US" dirty="0"/>
           </a:p>
@@ -601,7 +604,7 @@
           <a:p>
             <a:fld id="{48A87A34-81AB-432B-8DAE-1953F412C126}" type="datetimeFigureOut">
               <a:rPr lang="en-US" dirty="0"/>
-              <a:t>9/14/2021</a:t>
+              <a:t>9/18/2021</a:t>
             </a:fld>
             <a:endParaRPr lang="en-US" dirty="0"/>
           </a:p>
@@ -818,7 +821,7 @@
           <a:p>
             <a:fld id="{48A87A34-81AB-432B-8DAE-1953F412C126}" type="datetimeFigureOut">
               <a:rPr lang="en-US" dirty="0"/>
-              <a:t>9/14/2021</a:t>
+              <a:t>9/18/2021</a:t>
             </a:fld>
             <a:endParaRPr lang="en-US" dirty="0"/>
           </a:p>
@@ -1104,7 +1107,7 @@
           <a:p>
             <a:fld id="{48A87A34-81AB-432B-8DAE-1953F412C126}" type="datetimeFigureOut">
               <a:rPr lang="en-US" dirty="0"/>
-              <a:t>9/14/2021</a:t>
+              <a:t>9/18/2021</a:t>
             </a:fld>
             <a:endParaRPr lang="en-US" dirty="0"/>
           </a:p>
@@ -1553,7 +1556,7 @@
           <a:p>
             <a:fld id="{48A87A34-81AB-432B-8DAE-1953F412C126}" type="datetimeFigureOut">
               <a:rPr lang="en-US" dirty="0"/>
-              <a:t>9/14/2021</a:t>
+              <a:t>9/18/2021</a:t>
             </a:fld>
             <a:endParaRPr lang="en-US" dirty="0"/>
           </a:p>
@@ -2124,7 +2127,7 @@
           <a:p>
             <a:fld id="{48A87A34-81AB-432B-8DAE-1953F412C126}" type="datetimeFigureOut">
               <a:rPr lang="en-US" dirty="0"/>
-              <a:t>9/14/2021</a:t>
+              <a:t>9/18/2021</a:t>
             </a:fld>
             <a:endParaRPr lang="en-US" dirty="0"/>
           </a:p>
@@ -2980,7 +2983,7 @@
           <a:p>
             <a:fld id="{48A87A34-81AB-432B-8DAE-1953F412C126}" type="datetimeFigureOut">
               <a:rPr lang="en-US" dirty="0"/>
-              <a:t>9/14/2021</a:t>
+              <a:t>9/18/2021</a:t>
             </a:fld>
             <a:endParaRPr lang="en-US" dirty="0"/>
           </a:p>
@@ -3180,7 +3183,7 @@
           <a:p>
             <a:fld id="{48A87A34-81AB-432B-8DAE-1953F412C126}" type="datetimeFigureOut">
               <a:rPr lang="en-US" dirty="0"/>
-              <a:t>9/14/2021</a:t>
+              <a:t>9/18/2021</a:t>
             </a:fld>
             <a:endParaRPr lang="en-US" dirty="0"/>
           </a:p>
@@ -3389,7 +3392,7 @@
           <a:p>
             <a:fld id="{48A87A34-81AB-432B-8DAE-1953F412C126}" type="datetimeFigureOut">
               <a:rPr lang="en-US" dirty="0"/>
-              <a:t>9/14/2021</a:t>
+              <a:t>9/18/2021</a:t>
             </a:fld>
             <a:endParaRPr lang="en-US" dirty="0"/>
           </a:p>
@@ -3589,7 +3592,7 @@
           <a:p>
             <a:fld id="{48A87A34-81AB-432B-8DAE-1953F412C126}" type="datetimeFigureOut">
               <a:rPr lang="en-US" dirty="0"/>
-              <a:t>9/14/2021</a:t>
+              <a:t>9/18/2021</a:t>
             </a:fld>
             <a:endParaRPr lang="en-US" dirty="0"/>
           </a:p>
@@ -3864,7 +3867,7 @@
           <a:p>
             <a:fld id="{48A87A34-81AB-432B-8DAE-1953F412C126}" type="datetimeFigureOut">
               <a:rPr lang="en-US" dirty="0"/>
-              <a:t>9/14/2021</a:t>
+              <a:t>9/18/2021</a:t>
             </a:fld>
             <a:endParaRPr lang="en-US" dirty="0"/>
           </a:p>
@@ -4126,7 +4129,7 @@
           <a:p>
             <a:fld id="{48A87A34-81AB-432B-8DAE-1953F412C126}" type="datetimeFigureOut">
               <a:rPr lang="en-US" dirty="0"/>
-              <a:t>9/14/2021</a:t>
+              <a:t>9/18/2021</a:t>
             </a:fld>
             <a:endParaRPr lang="en-US" dirty="0"/>
           </a:p>
@@ -4536,7 +4539,7 @@
           <a:p>
             <a:fld id="{48A87A34-81AB-432B-8DAE-1953F412C126}" type="datetimeFigureOut">
               <a:rPr lang="en-US" dirty="0"/>
-              <a:t>9/14/2021</a:t>
+              <a:t>9/18/2021</a:t>
             </a:fld>
             <a:endParaRPr lang="en-US" dirty="0"/>
           </a:p>
@@ -4679,7 +4682,7 @@
           <a:p>
             <a:fld id="{48A87A34-81AB-432B-8DAE-1953F412C126}" type="datetimeFigureOut">
               <a:rPr lang="en-US" dirty="0"/>
-              <a:t>9/14/2021</a:t>
+              <a:t>9/18/2021</a:t>
             </a:fld>
             <a:endParaRPr lang="en-US" dirty="0"/>
           </a:p>
@@ -4799,7 +4802,7 @@
           <a:p>
             <a:fld id="{48A87A34-81AB-432B-8DAE-1953F412C126}" type="datetimeFigureOut">
               <a:rPr lang="en-US" dirty="0"/>
-              <a:t>9/14/2021</a:t>
+              <a:t>9/18/2021</a:t>
             </a:fld>
             <a:endParaRPr lang="en-US" dirty="0"/>
           </a:p>
@@ -5073,7 +5076,7 @@
           <a:p>
             <a:fld id="{48A87A34-81AB-432B-8DAE-1953F412C126}" type="datetimeFigureOut">
               <a:rPr lang="en-US" dirty="0"/>
-              <a:t>9/14/2021</a:t>
+              <a:t>9/18/2021</a:t>
             </a:fld>
             <a:endParaRPr lang="en-US" dirty="0"/>
           </a:p>
@@ -5383,7 +5386,7 @@
           <a:p>
             <a:fld id="{48A87A34-81AB-432B-8DAE-1953F412C126}" type="datetimeFigureOut">
               <a:rPr lang="en-US" dirty="0"/>
-              <a:t>9/14/2021</a:t>
+              <a:t>9/18/2021</a:t>
             </a:fld>
             <a:endParaRPr lang="en-US" dirty="0"/>
           </a:p>
@@ -5632,7 +5635,7 @@
             <a:fld id="{48A87A34-81AB-432B-8DAE-1953F412C126}" type="datetimeFigureOut">
               <a:rPr lang="en-US" dirty="0"/>
               <a:pPr/>
-              <a:t>9/14/2021</a:t>
+              <a:t>9/18/2021</a:t>
             </a:fld>
             <a:endParaRPr lang="en-US" dirty="0"/>
           </a:p>
@@ -6148,6 +6151,332 @@
     <p:extLst>
       <p:ext uri="{BB962C8B-B14F-4D97-AF65-F5344CB8AC3E}">
         <p14:creationId xmlns:p14="http://schemas.microsoft.com/office/powerpoint/2010/main" val="520530722"/>
+      </p:ext>
+    </p:extLst>
+  </p:cSld>
+  <p:clrMapOvr>
+    <a:masterClrMapping/>
+  </p:clrMapOvr>
+</p:sld>
+</file>
+
+<file path=ppt/slides/slide10.xml><?xml version="1.0" encoding="utf-8"?>
+<p:sld xmlns:a="http://schemas.openxmlformats.org/drawingml/2006/main" xmlns:r="http://schemas.openxmlformats.org/officeDocument/2006/relationships" xmlns:p="http://schemas.openxmlformats.org/presentationml/2006/main">
+  <p:cSld>
+    <p:spTree>
+      <p:nvGrpSpPr>
+        <p:cNvPr id="1" name=""/>
+        <p:cNvGrpSpPr/>
+        <p:nvPr/>
+      </p:nvGrpSpPr>
+      <p:grpSpPr>
+        <a:xfrm>
+          <a:off x="0" y="0"/>
+          <a:ext cx="0" cy="0"/>
+          <a:chOff x="0" y="0"/>
+          <a:chExt cx="0" cy="0"/>
+        </a:xfrm>
+      </p:grpSpPr>
+      <p:sp>
+        <p:nvSpPr>
+          <p:cNvPr id="2" name="Title 1">
+            <a:extLst>
+              <a:ext uri="{FF2B5EF4-FFF2-40B4-BE49-F238E27FC236}">
+                <a16:creationId xmlns:a16="http://schemas.microsoft.com/office/drawing/2014/main" id="{24F23111-5BDA-4C61-92E0-A87B607D050C}"/>
+              </a:ext>
+            </a:extLst>
+          </p:cNvPr>
+          <p:cNvSpPr>
+            <a:spLocks noGrp="1"/>
+          </p:cNvSpPr>
+          <p:nvPr>
+            <p:ph type="title"/>
+          </p:nvPr>
+        </p:nvSpPr>
+        <p:spPr>
+          <a:xfrm>
+            <a:off x="824348" y="275538"/>
+            <a:ext cx="10364451" cy="1596177"/>
+          </a:xfrm>
+        </p:spPr>
+        <p:txBody>
+          <a:bodyPr/>
+          <a:lstStyle/>
+          <a:p>
+            <a:r>
+              <a:rPr lang="en-US" b="1" dirty="0"/>
+              <a:t>From Group and form control</a:t>
+            </a:r>
+            <a:endParaRPr lang="en-IN" b="1" dirty="0"/>
+          </a:p>
+        </p:txBody>
+      </p:sp>
+      <p:pic>
+        <p:nvPicPr>
+          <p:cNvPr id="7" name="Picture 6">
+            <a:extLst>
+              <a:ext uri="{FF2B5EF4-FFF2-40B4-BE49-F238E27FC236}">
+                <a16:creationId xmlns:a16="http://schemas.microsoft.com/office/drawing/2014/main" id="{C2F2A987-E4A4-4C44-9AC5-EB1496226A19}"/>
+              </a:ext>
+            </a:extLst>
+          </p:cNvPr>
+          <p:cNvPicPr>
+            <a:picLocks noChangeAspect="1"/>
+          </p:cNvPicPr>
+          <p:nvPr/>
+        </p:nvPicPr>
+        <p:blipFill>
+          <a:blip r:embed="rId2"/>
+          <a:stretch>
+            <a:fillRect/>
+          </a:stretch>
+        </p:blipFill>
+        <p:spPr>
+          <a:xfrm>
+            <a:off x="1988595" y="1613538"/>
+            <a:ext cx="8035956" cy="4729649"/>
+          </a:xfrm>
+          <a:prstGeom prst="rect">
+            <a:avLst/>
+          </a:prstGeom>
+        </p:spPr>
+      </p:pic>
+    </p:spTree>
+    <p:extLst>
+      <p:ext uri="{BB962C8B-B14F-4D97-AF65-F5344CB8AC3E}">
+        <p14:creationId xmlns:p14="http://schemas.microsoft.com/office/powerpoint/2010/main" val="985050633"/>
+      </p:ext>
+    </p:extLst>
+  </p:cSld>
+  <p:clrMapOvr>
+    <a:masterClrMapping/>
+  </p:clrMapOvr>
+</p:sld>
+</file>
+
+<file path=ppt/slides/slide11.xml><?xml version="1.0" encoding="utf-8"?>
+<p:sld xmlns:a="http://schemas.openxmlformats.org/drawingml/2006/main" xmlns:r="http://schemas.openxmlformats.org/officeDocument/2006/relationships" xmlns:p="http://schemas.openxmlformats.org/presentationml/2006/main">
+  <p:cSld>
+    <p:spTree>
+      <p:nvGrpSpPr>
+        <p:cNvPr id="1" name=""/>
+        <p:cNvGrpSpPr/>
+        <p:nvPr/>
+      </p:nvGrpSpPr>
+      <p:grpSpPr>
+        <a:xfrm>
+          <a:off x="0" y="0"/>
+          <a:ext cx="0" cy="0"/>
+          <a:chOff x="0" y="0"/>
+          <a:chExt cx="0" cy="0"/>
+        </a:xfrm>
+      </p:grpSpPr>
+      <p:sp>
+        <p:nvSpPr>
+          <p:cNvPr id="2" name="Title 1">
+            <a:extLst>
+              <a:ext uri="{FF2B5EF4-FFF2-40B4-BE49-F238E27FC236}">
+                <a16:creationId xmlns:a16="http://schemas.microsoft.com/office/drawing/2014/main" id="{8E456AD0-F1B7-4CED-9DD9-F00005B669B2}"/>
+              </a:ext>
+            </a:extLst>
+          </p:cNvPr>
+          <p:cNvSpPr>
+            <a:spLocks noGrp="1"/>
+          </p:cNvSpPr>
+          <p:nvPr>
+            <p:ph type="title"/>
+          </p:nvPr>
+        </p:nvSpPr>
+        <p:spPr/>
+        <p:txBody>
+          <a:bodyPr/>
+          <a:lstStyle/>
+          <a:p>
+            <a:r>
+              <a:rPr lang="en-US" b="1" dirty="0"/>
+              <a:t>Binding create form In template</a:t>
+            </a:r>
+            <a:endParaRPr lang="en-IN" b="1" dirty="0"/>
+          </a:p>
+        </p:txBody>
+      </p:sp>
+      <p:sp>
+        <p:nvSpPr>
+          <p:cNvPr id="3" name="Content Placeholder 2">
+            <a:extLst>
+              <a:ext uri="{FF2B5EF4-FFF2-40B4-BE49-F238E27FC236}">
+                <a16:creationId xmlns:a16="http://schemas.microsoft.com/office/drawing/2014/main" id="{96971BE3-2C61-4208-824E-A78094ECD9C6}"/>
+              </a:ext>
+            </a:extLst>
+          </p:cNvPr>
+          <p:cNvSpPr>
+            <a:spLocks noGrp="1"/>
+          </p:cNvSpPr>
+          <p:nvPr>
+            <p:ph sz="quarter" idx="13"/>
+          </p:nvPr>
+        </p:nvSpPr>
+        <p:spPr/>
+        <p:txBody>
+          <a:bodyPr/>
+          <a:lstStyle/>
+          <a:p>
+            <a:endParaRPr lang="en-IN"/>
+          </a:p>
+        </p:txBody>
+      </p:sp>
+      <p:pic>
+        <p:nvPicPr>
+          <p:cNvPr id="5" name="Picture 4">
+            <a:extLst>
+              <a:ext uri="{FF2B5EF4-FFF2-40B4-BE49-F238E27FC236}">
+                <a16:creationId xmlns:a16="http://schemas.microsoft.com/office/drawing/2014/main" id="{9FA9E3B5-EC11-4EC0-8FF5-6EFA2A8C4C92}"/>
+              </a:ext>
+            </a:extLst>
+          </p:cNvPr>
+          <p:cNvPicPr>
+            <a:picLocks noChangeAspect="1"/>
+          </p:cNvPicPr>
+          <p:nvPr/>
+        </p:nvPicPr>
+        <p:blipFill>
+          <a:blip r:embed="rId2"/>
+          <a:stretch>
+            <a:fillRect/>
+          </a:stretch>
+        </p:blipFill>
+        <p:spPr>
+          <a:xfrm>
+            <a:off x="257139" y="2513948"/>
+            <a:ext cx="11677095" cy="3130393"/>
+          </a:xfrm>
+          <a:prstGeom prst="rect">
+            <a:avLst/>
+          </a:prstGeom>
+        </p:spPr>
+      </p:pic>
+    </p:spTree>
+    <p:extLst>
+      <p:ext uri="{BB962C8B-B14F-4D97-AF65-F5344CB8AC3E}">
+        <p14:creationId xmlns:p14="http://schemas.microsoft.com/office/powerpoint/2010/main" val="784572994"/>
+      </p:ext>
+    </p:extLst>
+  </p:cSld>
+  <p:clrMapOvr>
+    <a:masterClrMapping/>
+  </p:clrMapOvr>
+</p:sld>
+</file>
+
+<file path=ppt/slides/slide12.xml><?xml version="1.0" encoding="utf-8"?>
+<p:sld xmlns:a="http://schemas.openxmlformats.org/drawingml/2006/main" xmlns:r="http://schemas.openxmlformats.org/officeDocument/2006/relationships" xmlns:p="http://schemas.openxmlformats.org/presentationml/2006/main">
+  <p:cSld>
+    <p:spTree>
+      <p:nvGrpSpPr>
+        <p:cNvPr id="1" name=""/>
+        <p:cNvGrpSpPr/>
+        <p:nvPr/>
+      </p:nvGrpSpPr>
+      <p:grpSpPr>
+        <a:xfrm>
+          <a:off x="0" y="0"/>
+          <a:ext cx="0" cy="0"/>
+          <a:chOff x="0" y="0"/>
+          <a:chExt cx="0" cy="0"/>
+        </a:xfrm>
+      </p:grpSpPr>
+      <p:sp>
+        <p:nvSpPr>
+          <p:cNvPr id="2" name="Title 1">
+            <a:extLst>
+              <a:ext uri="{FF2B5EF4-FFF2-40B4-BE49-F238E27FC236}">
+                <a16:creationId xmlns:a16="http://schemas.microsoft.com/office/drawing/2014/main" id="{7B726CF5-6414-4B24-8705-D40165254305}"/>
+              </a:ext>
+            </a:extLst>
+          </p:cNvPr>
+          <p:cNvSpPr>
+            <a:spLocks noGrp="1"/>
+          </p:cNvSpPr>
+          <p:nvPr>
+            <p:ph type="title"/>
+          </p:nvPr>
+        </p:nvSpPr>
+        <p:spPr/>
+        <p:txBody>
+          <a:bodyPr/>
+          <a:lstStyle/>
+          <a:p>
+            <a:r>
+              <a:rPr lang="en-US" b="1" dirty="0"/>
+              <a:t>Nested From Group</a:t>
+            </a:r>
+            <a:endParaRPr lang="en-IN" b="1" dirty="0"/>
+          </a:p>
+        </p:txBody>
+      </p:sp>
+      <p:pic>
+        <p:nvPicPr>
+          <p:cNvPr id="5" name="Content Placeholder 4">
+            <a:extLst>
+              <a:ext uri="{FF2B5EF4-FFF2-40B4-BE49-F238E27FC236}">
+                <a16:creationId xmlns:a16="http://schemas.microsoft.com/office/drawing/2014/main" id="{CE073590-422A-4F1D-B060-D439DFAE44D2}"/>
+              </a:ext>
+            </a:extLst>
+          </p:cNvPr>
+          <p:cNvPicPr>
+            <a:picLocks noGrp="1" noChangeAspect="1"/>
+          </p:cNvPicPr>
+          <p:nvPr>
+            <p:ph sz="quarter" idx="13"/>
+          </p:nvPr>
+        </p:nvPicPr>
+        <p:blipFill>
+          <a:blip r:embed="rId2"/>
+          <a:stretch>
+            <a:fillRect/>
+          </a:stretch>
+        </p:blipFill>
+        <p:spPr>
+          <a:xfrm>
+            <a:off x="6096000" y="2001630"/>
+            <a:ext cx="5303941" cy="4052756"/>
+          </a:xfrm>
+        </p:spPr>
+      </p:pic>
+      <p:pic>
+        <p:nvPicPr>
+          <p:cNvPr id="7" name="Picture 6">
+            <a:extLst>
+              <a:ext uri="{FF2B5EF4-FFF2-40B4-BE49-F238E27FC236}">
+                <a16:creationId xmlns:a16="http://schemas.microsoft.com/office/drawing/2014/main" id="{E9FC89BD-5F06-49BD-B97C-71E7FB016B1E}"/>
+              </a:ext>
+            </a:extLst>
+          </p:cNvPr>
+          <p:cNvPicPr>
+            <a:picLocks noChangeAspect="1"/>
+          </p:cNvPicPr>
+          <p:nvPr/>
+        </p:nvPicPr>
+        <p:blipFill>
+          <a:blip r:embed="rId3"/>
+          <a:stretch>
+            <a:fillRect/>
+          </a:stretch>
+        </p:blipFill>
+        <p:spPr>
+          <a:xfrm>
+            <a:off x="796900" y="2001630"/>
+            <a:ext cx="4814348" cy="4052756"/>
+          </a:xfrm>
+          <a:prstGeom prst="rect">
+            <a:avLst/>
+          </a:prstGeom>
+        </p:spPr>
+      </p:pic>
+    </p:spTree>
+    <p:extLst>
+      <p:ext uri="{BB962C8B-B14F-4D97-AF65-F5344CB8AC3E}">
+        <p14:creationId xmlns:p14="http://schemas.microsoft.com/office/powerpoint/2010/main" val="1960932403"/>
       </p:ext>
     </p:extLst>
   </p:cSld>
@@ -8648,7 +8977,7 @@
         </p:nvSpPr>
         <p:spPr>
           <a:xfrm>
-            <a:off x="913774" y="161315"/>
+            <a:off x="807242" y="-87259"/>
             <a:ext cx="10364451" cy="1596177"/>
           </a:xfrm>
         </p:spPr>
@@ -8657,365 +8986,43 @@
           <a:lstStyle/>
           <a:p>
             <a:r>
-              <a:rPr lang="en-US" dirty="0"/>
+              <a:rPr lang="en-US" b="1" dirty="0"/>
               <a:t>Working with Template driven forms</a:t>
             </a:r>
-            <a:endParaRPr lang="en-IN" dirty="0"/>
-          </a:p>
-        </p:txBody>
-      </p:sp>
-      <p:sp>
-        <p:nvSpPr>
-          <p:cNvPr id="3" name="Content Placeholder 2">
+            <a:endParaRPr lang="en-IN" b="1" dirty="0"/>
+          </a:p>
+        </p:txBody>
+      </p:sp>
+      <p:pic>
+        <p:nvPicPr>
+          <p:cNvPr id="5" name="Picture 4">
             <a:extLst>
               <a:ext uri="{FF2B5EF4-FFF2-40B4-BE49-F238E27FC236}">
-                <a16:creationId xmlns:a16="http://schemas.microsoft.com/office/drawing/2014/main" id="{AB6E4F1C-5942-4BC4-9E09-80B003D54DAC}"/>
+                <a16:creationId xmlns:a16="http://schemas.microsoft.com/office/drawing/2014/main" id="{6B0DFDE1-802D-48A9-B709-D28DDFCEF115}"/>
               </a:ext>
             </a:extLst>
           </p:cNvPr>
-          <p:cNvSpPr>
-            <a:spLocks noGrp="1"/>
-          </p:cNvSpPr>
-          <p:nvPr>
-            <p:ph sz="quarter" idx="13"/>
-          </p:nvPr>
-        </p:nvSpPr>
+          <p:cNvPicPr>
+            <a:picLocks noChangeAspect="1"/>
+          </p:cNvPicPr>
+          <p:nvPr/>
+        </p:nvPicPr>
+        <p:blipFill>
+          <a:blip r:embed="rId2"/>
+          <a:stretch>
+            <a:fillRect/>
+          </a:stretch>
+        </p:blipFill>
         <p:spPr>
           <a:xfrm>
-            <a:off x="913774" y="1757492"/>
-            <a:ext cx="10363826" cy="4169175"/>
+            <a:off x="2494623" y="1128861"/>
+            <a:ext cx="6578356" cy="5644941"/>
           </a:xfrm>
+          <a:prstGeom prst="rect">
+            <a:avLst/>
+          </a:prstGeom>
         </p:spPr>
-        <p:txBody>
-          <a:bodyPr>
-            <a:normAutofit fontScale="92500" lnSpcReduction="20000"/>
-          </a:bodyPr>
-          <a:lstStyle/>
-          <a:p>
-            <a:r>
-              <a:rPr lang="en-IN" b="1" i="0" dirty="0">
-                <a:solidFill>
-                  <a:srgbClr val="000000"/>
-                </a:solidFill>
-                <a:effectLst/>
-                <a:latin typeface="-apple-system"/>
-              </a:rPr>
-              <a:t>Import Forms Module</a:t>
-            </a:r>
-          </a:p>
-          <a:p>
-            <a:pPr marL="685800" lvl="2">
-              <a:spcBef>
-                <a:spcPts val="1000"/>
-              </a:spcBef>
-            </a:pPr>
-            <a:r>
-              <a:rPr lang="en-IN" cap="none" dirty="0">
-                <a:solidFill>
-                  <a:srgbClr val="000000"/>
-                </a:solidFill>
-                <a:latin typeface="-apple-system"/>
-              </a:rPr>
-              <a:t>Import {  </a:t>
-            </a:r>
-            <a:r>
-              <a:rPr lang="en-IN" cap="none" dirty="0" err="1">
-                <a:solidFill>
-                  <a:srgbClr val="000000"/>
-                </a:solidFill>
-                <a:latin typeface="-apple-system"/>
-              </a:rPr>
-              <a:t>FormsModule</a:t>
-            </a:r>
-            <a:r>
-              <a:rPr lang="en-IN" cap="none" dirty="0">
-                <a:solidFill>
-                  <a:srgbClr val="000000"/>
-                </a:solidFill>
-                <a:latin typeface="-apple-system"/>
-              </a:rPr>
-              <a:t>  } from '@angular/forms';</a:t>
-            </a:r>
-          </a:p>
-          <a:p>
-            <a:pPr lvl="1"/>
-            <a:r>
-              <a:rPr lang="en-IN" sz="1600" cap="none" dirty="0">
-                <a:solidFill>
-                  <a:srgbClr val="000000"/>
-                </a:solidFill>
-                <a:latin typeface="-apple-system"/>
-              </a:rPr>
-              <a:t>imports: [</a:t>
-            </a:r>
-          </a:p>
-          <a:p>
-            <a:pPr marL="457200" lvl="1" indent="0">
-              <a:buNone/>
-            </a:pPr>
-            <a:r>
-              <a:rPr lang="en-IN" sz="1600" cap="none" dirty="0">
-                <a:solidFill>
-                  <a:srgbClr val="000000"/>
-                </a:solidFill>
-                <a:latin typeface="-apple-system"/>
-              </a:rPr>
-              <a:t>	   …..</a:t>
-            </a:r>
-          </a:p>
-          <a:p>
-            <a:pPr marL="457200" lvl="1" indent="0">
-              <a:buNone/>
-            </a:pPr>
-            <a:r>
-              <a:rPr lang="en-IN" sz="1600" cap="none" dirty="0">
-                <a:solidFill>
-                  <a:srgbClr val="000000"/>
-                </a:solidFill>
-                <a:latin typeface="-apple-system"/>
-              </a:rPr>
-              <a:t>	  </a:t>
-            </a:r>
-            <a:r>
-              <a:rPr lang="en-IN" sz="1600" cap="none" dirty="0" err="1">
-                <a:solidFill>
-                  <a:srgbClr val="000000"/>
-                </a:solidFill>
-                <a:latin typeface="-apple-system"/>
-              </a:rPr>
-              <a:t>FormsModule</a:t>
-            </a:r>
-            <a:endParaRPr lang="en-IN" sz="1600" cap="none" dirty="0">
-              <a:solidFill>
-                <a:srgbClr val="000000"/>
-              </a:solidFill>
-              <a:latin typeface="-apple-system"/>
-            </a:endParaRPr>
-          </a:p>
-          <a:p>
-            <a:pPr marL="457200" lvl="1" indent="0">
-              <a:buNone/>
-            </a:pPr>
-            <a:r>
-              <a:rPr lang="en-IN" sz="1600" cap="none" dirty="0">
-                <a:solidFill>
-                  <a:srgbClr val="000000"/>
-                </a:solidFill>
-                <a:latin typeface="-apple-system"/>
-              </a:rPr>
-              <a:t>	],</a:t>
-            </a:r>
-          </a:p>
-          <a:p>
-            <a:pPr marL="457200" lvl="1" indent="0">
-              <a:buNone/>
-            </a:pPr>
-            <a:endParaRPr lang="en-IN" sz="1600" cap="none" dirty="0">
-              <a:solidFill>
-                <a:srgbClr val="000000"/>
-              </a:solidFill>
-              <a:latin typeface="-apple-system"/>
-            </a:endParaRPr>
-          </a:p>
-          <a:p>
-            <a:pPr lvl="1"/>
-            <a:r>
-              <a:rPr lang="en-IN" sz="1600" cap="none" dirty="0">
-                <a:solidFill>
-                  <a:srgbClr val="000000"/>
-                </a:solidFill>
-                <a:latin typeface="-apple-system"/>
-              </a:rPr>
-              <a:t>&lt;form #contactForm="ngForm“ ….</a:t>
-            </a:r>
-          </a:p>
-          <a:p>
-            <a:pPr lvl="2"/>
-            <a:r>
-              <a:rPr lang="en-US" cap="none" dirty="0">
-                <a:solidFill>
-                  <a:srgbClr val="000000"/>
-                </a:solidFill>
-                <a:latin typeface="-apple-system"/>
-              </a:rPr>
-              <a:t>Creates a top-level </a:t>
-            </a:r>
-            <a:r>
-              <a:rPr lang="en-US" cap="none" dirty="0" err="1">
-                <a:solidFill>
-                  <a:srgbClr val="000000"/>
-                </a:solidFill>
-                <a:latin typeface="-apple-system"/>
-              </a:rPr>
-              <a:t>FormGroup</a:t>
-            </a:r>
-            <a:r>
-              <a:rPr lang="en-US" cap="none" dirty="0">
-                <a:solidFill>
-                  <a:srgbClr val="000000"/>
-                </a:solidFill>
-                <a:latin typeface="-apple-system"/>
-              </a:rPr>
-              <a:t> instance</a:t>
-            </a:r>
-          </a:p>
-          <a:p>
-            <a:pPr lvl="2"/>
-            <a:r>
-              <a:rPr lang="en-US" cap="none" dirty="0">
-                <a:solidFill>
-                  <a:srgbClr val="000000"/>
-                </a:solidFill>
-                <a:latin typeface="-apple-system"/>
-              </a:rPr>
-              <a:t>We have access to the </a:t>
-            </a:r>
-            <a:r>
-              <a:rPr lang="en-US" cap="none" dirty="0" err="1">
-                <a:solidFill>
-                  <a:srgbClr val="000000"/>
-                </a:solidFill>
-                <a:latin typeface="-apple-system"/>
-              </a:rPr>
-              <a:t>ngForm</a:t>
-            </a:r>
-            <a:r>
-              <a:rPr lang="en-US" cap="none" dirty="0">
-                <a:solidFill>
-                  <a:srgbClr val="000000"/>
-                </a:solidFill>
-                <a:latin typeface="-apple-system"/>
-              </a:rPr>
-              <a:t> instance via the local template variable</a:t>
-            </a:r>
-            <a:endParaRPr lang="en-IN" cap="none" dirty="0">
-              <a:solidFill>
-                <a:srgbClr val="000000"/>
-              </a:solidFill>
-              <a:latin typeface="-apple-system"/>
-            </a:endParaRPr>
-          </a:p>
-          <a:p>
-            <a:pPr lvl="1"/>
-            <a:r>
-              <a:rPr lang="en-US" sz="1600" cap="none" dirty="0">
-                <a:solidFill>
-                  <a:srgbClr val="000000"/>
-                </a:solidFill>
-                <a:latin typeface="-apple-system"/>
-              </a:rPr>
-              <a:t>&lt;input type="text" name="</a:t>
-            </a:r>
-            <a:r>
-              <a:rPr lang="en-US" sz="1600" cap="none" dirty="0" err="1">
-                <a:solidFill>
-                  <a:srgbClr val="000000"/>
-                </a:solidFill>
-                <a:latin typeface="-apple-system"/>
-              </a:rPr>
-              <a:t>firstname</a:t>
-            </a:r>
-            <a:r>
-              <a:rPr lang="en-US" sz="1600" cap="none" dirty="0">
-                <a:solidFill>
-                  <a:srgbClr val="000000"/>
-                </a:solidFill>
-                <a:latin typeface="-apple-system"/>
-              </a:rPr>
-              <a:t>" </a:t>
-            </a:r>
-            <a:r>
-              <a:rPr lang="en-US" sz="1600" cap="none" dirty="0" err="1">
-                <a:solidFill>
-                  <a:srgbClr val="000000"/>
-                </a:solidFill>
-                <a:latin typeface="-apple-system"/>
-              </a:rPr>
-              <a:t>ngModel</a:t>
-            </a:r>
-            <a:r>
-              <a:rPr lang="en-US" sz="1600" cap="none" dirty="0">
-                <a:solidFill>
-                  <a:srgbClr val="000000"/>
-                </a:solidFill>
-                <a:latin typeface="-apple-system"/>
-              </a:rPr>
-              <a:t>&gt;</a:t>
-            </a:r>
-            <a:endParaRPr lang="en-IN" sz="1600" cap="none" dirty="0">
-              <a:solidFill>
-                <a:srgbClr val="000000"/>
-              </a:solidFill>
-              <a:latin typeface="-apple-system"/>
-            </a:endParaRPr>
-          </a:p>
-          <a:p>
-            <a:pPr lvl="2"/>
-            <a:r>
-              <a:rPr lang="en-US" sz="1800" cap="none" dirty="0" err="1">
-                <a:solidFill>
-                  <a:srgbClr val="000000"/>
-                </a:solidFill>
-                <a:latin typeface="-apple-system"/>
-              </a:rPr>
-              <a:t>ngModel</a:t>
-            </a:r>
-            <a:r>
-              <a:rPr lang="en-US" sz="1800" cap="none" dirty="0">
-                <a:solidFill>
-                  <a:srgbClr val="000000"/>
-                </a:solidFill>
-                <a:latin typeface="-apple-system"/>
-              </a:rPr>
-              <a:t> will use the name attribute to create the </a:t>
-            </a:r>
-            <a:r>
-              <a:rPr lang="en-US" sz="1800" cap="none" dirty="0" err="1">
-                <a:solidFill>
-                  <a:srgbClr val="000000"/>
-                </a:solidFill>
-                <a:latin typeface="-apple-system"/>
-              </a:rPr>
-              <a:t>FormControl</a:t>
-            </a:r>
-            <a:r>
-              <a:rPr lang="en-US" sz="1800" cap="none" dirty="0">
-                <a:solidFill>
-                  <a:srgbClr val="000000"/>
-                </a:solidFill>
-                <a:latin typeface="-apple-system"/>
-              </a:rPr>
-              <a:t> instance for each of the Form field it is attached.</a:t>
-            </a:r>
-            <a:endParaRPr lang="en-IN" sz="1800" cap="none" dirty="0">
-              <a:solidFill>
-                <a:srgbClr val="000000"/>
-              </a:solidFill>
-              <a:latin typeface="-apple-system"/>
-            </a:endParaRPr>
-          </a:p>
-          <a:p>
-            <a:pPr lvl="2"/>
-            <a:endParaRPr lang="en-IN" sz="1400" cap="none" dirty="0">
-              <a:solidFill>
-                <a:srgbClr val="000000"/>
-              </a:solidFill>
-              <a:latin typeface="-apple-system"/>
-            </a:endParaRPr>
-          </a:p>
-          <a:p>
-            <a:pPr marL="457200" lvl="1" indent="0">
-              <a:buNone/>
-            </a:pPr>
-            <a:endParaRPr lang="en-IN" sz="1600" cap="none" dirty="0">
-              <a:solidFill>
-                <a:srgbClr val="000000"/>
-              </a:solidFill>
-              <a:latin typeface="-apple-system"/>
-            </a:endParaRPr>
-          </a:p>
-        </p:txBody>
-      </p:sp>
+      </p:pic>
     </p:spTree>
     <p:extLst>
       <p:ext uri="{BB962C8B-B14F-4D97-AF65-F5344CB8AC3E}">
@@ -9051,7 +9058,7 @@
           <p:cNvPr id="2" name="Title 1">
             <a:extLst>
               <a:ext uri="{FF2B5EF4-FFF2-40B4-BE49-F238E27FC236}">
-                <a16:creationId xmlns:a16="http://schemas.microsoft.com/office/drawing/2014/main" id="{5019EBAB-277E-46AC-9429-148EE4121B55}"/>
+                <a16:creationId xmlns:a16="http://schemas.microsoft.com/office/drawing/2014/main" id="{91E32E35-88EC-4BA9-B714-EFD5FF1FBC0F}"/>
               </a:ext>
             </a:extLst>
           </p:cNvPr>
@@ -9062,17 +9069,12 @@
             <p:ph type="title"/>
           </p:nvPr>
         </p:nvSpPr>
-        <p:spPr>
-          <a:xfrm>
-            <a:off x="913774" y="305099"/>
-            <a:ext cx="10364451" cy="1086105"/>
-          </a:xfrm>
-        </p:spPr>
+        <p:spPr/>
         <p:txBody>
           <a:bodyPr/>
           <a:lstStyle/>
           <a:p>
-            <a:endParaRPr lang="en-IN" dirty="0"/>
+            <a:endParaRPr lang="en-IN"/>
           </a:p>
         </p:txBody>
       </p:sp>
@@ -9081,7 +9083,7 @@
           <p:cNvPr id="3" name="Content Placeholder 2">
             <a:extLst>
               <a:ext uri="{FF2B5EF4-FFF2-40B4-BE49-F238E27FC236}">
-                <a16:creationId xmlns:a16="http://schemas.microsoft.com/office/drawing/2014/main" id="{AF15D27D-3E6C-4F50-AE4A-F7E1B61B2152}"/>
+                <a16:creationId xmlns:a16="http://schemas.microsoft.com/office/drawing/2014/main" id="{6AE01106-F921-40BD-B596-68602C350198}"/>
               </a:ext>
             </a:extLst>
           </p:cNvPr>
@@ -9092,951 +9094,205 @@
             <p:ph sz="quarter" idx="13"/>
           </p:nvPr>
         </p:nvSpPr>
-        <p:spPr/>
+        <p:spPr>
+          <a:xfrm>
+            <a:off x="914399" y="4469584"/>
+            <a:ext cx="10363826" cy="2135402"/>
+          </a:xfrm>
+        </p:spPr>
         <p:txBody>
           <a:bodyPr>
-            <a:normAutofit fontScale="70000" lnSpcReduction="20000"/>
+            <a:normAutofit lnSpcReduction="10000"/>
           </a:bodyPr>
           <a:lstStyle/>
           <a:p>
-            <a:pPr marL="0" indent="0">
-              <a:buNone/>
-            </a:pPr>
-            <a:r>
-              <a:rPr lang="en-IN" b="0" i="0" dirty="0">
-                <a:solidFill>
-                  <a:srgbClr val="006FE0"/>
-                </a:solidFill>
-                <a:effectLst/>
-                <a:latin typeface="Consolas" panose="020B0609020204030204" pitchFamily="49" charset="0"/>
-              </a:rPr>
-              <a:t>&lt;</a:t>
-            </a:r>
-            <a:r>
-              <a:rPr lang="en-IN" b="0" i="0" dirty="0">
+            <a:pPr lvl="1"/>
+            <a:r>
+              <a:rPr lang="en-IN" sz="1600" cap="none" dirty="0">
                 <a:solidFill>
                   <a:srgbClr val="000000"/>
                 </a:solidFill>
-                <a:effectLst/>
-                <a:latin typeface="Consolas" panose="020B0609020204030204" pitchFamily="49" charset="0"/>
+                <a:latin typeface="-apple-system"/>
               </a:rPr>
-              <a:t>form</a:t>
-            </a:r>
-            <a:r>
-              <a:rPr lang="en-IN" b="0" i="0" dirty="0">
-                <a:solidFill>
-                  <a:srgbClr val="006FE0"/>
-                </a:solidFill>
-                <a:effectLst/>
-                <a:latin typeface="Consolas" panose="020B0609020204030204" pitchFamily="49" charset="0"/>
-              </a:rPr>
-              <a:t> </a:t>
-            </a:r>
-            <a:r>
-              <a:rPr lang="en-IN" b="0" i="0" dirty="0">
-                <a:solidFill>
-                  <a:srgbClr val="B85C00"/>
-                </a:solidFill>
-                <a:effectLst/>
-                <a:latin typeface="Consolas" panose="020B0609020204030204" pitchFamily="49" charset="0"/>
-              </a:rPr>
-              <a:t>#contactForm="ngForm" (</a:t>
-            </a:r>
-            <a:r>
-              <a:rPr lang="en-IN" b="0" i="0" dirty="0" err="1">
-                <a:solidFill>
-                  <a:srgbClr val="B85C00"/>
-                </a:solidFill>
-                <a:effectLst/>
-                <a:latin typeface="Consolas" panose="020B0609020204030204" pitchFamily="49" charset="0"/>
-              </a:rPr>
-              <a:t>ngSubmit</a:t>
-            </a:r>
-            <a:r>
-              <a:rPr lang="en-IN" b="0" i="0" dirty="0">
-                <a:solidFill>
-                  <a:srgbClr val="B85C00"/>
-                </a:solidFill>
-                <a:effectLst/>
-                <a:latin typeface="Consolas" panose="020B0609020204030204" pitchFamily="49" charset="0"/>
-              </a:rPr>
-              <a:t>)="</a:t>
-            </a:r>
-            <a:r>
-              <a:rPr lang="en-IN" b="0" i="0" dirty="0" err="1">
-                <a:solidFill>
-                  <a:srgbClr val="B85C00"/>
-                </a:solidFill>
-                <a:effectLst/>
-                <a:latin typeface="Consolas" panose="020B0609020204030204" pitchFamily="49" charset="0"/>
-              </a:rPr>
-              <a:t>onSubmit</a:t>
-            </a:r>
-            <a:r>
-              <a:rPr lang="en-IN" b="0" i="0" dirty="0">
-                <a:solidFill>
-                  <a:srgbClr val="B85C00"/>
-                </a:solidFill>
-                <a:effectLst/>
-                <a:latin typeface="Consolas" panose="020B0609020204030204" pitchFamily="49" charset="0"/>
-              </a:rPr>
-              <a:t>(</a:t>
-            </a:r>
-            <a:r>
-              <a:rPr lang="en-IN" b="0" i="0" dirty="0" err="1">
-                <a:solidFill>
-                  <a:srgbClr val="B85C00"/>
-                </a:solidFill>
-                <a:effectLst/>
-                <a:latin typeface="Consolas" panose="020B0609020204030204" pitchFamily="49" charset="0"/>
-              </a:rPr>
-              <a:t>contactForm</a:t>
-            </a:r>
-            <a:r>
-              <a:rPr lang="en-IN" b="0" i="0" dirty="0">
-                <a:solidFill>
-                  <a:srgbClr val="B85C00"/>
-                </a:solidFill>
-                <a:effectLst/>
-                <a:latin typeface="Consolas" panose="020B0609020204030204" pitchFamily="49" charset="0"/>
-              </a:rPr>
-              <a:t>)"&gt;</a:t>
-            </a:r>
-          </a:p>
-          <a:p>
-            <a:pPr marL="0" indent="0" algn="l" fontAlgn="base">
-              <a:buNone/>
-            </a:pPr>
-            <a:r>
-              <a:rPr lang="en-IN" dirty="0">
-                <a:solidFill>
-                  <a:srgbClr val="B85C00"/>
-                </a:solidFill>
-                <a:latin typeface="Consolas" panose="020B0609020204030204" pitchFamily="49" charset="0"/>
-              </a:rPr>
-              <a:t>	</a:t>
-            </a:r>
-            <a:r>
-              <a:rPr lang="en-IN" b="0" i="0" dirty="0">
-                <a:solidFill>
-                  <a:srgbClr val="006FE0"/>
-                </a:solidFill>
-                <a:effectLst/>
-                <a:latin typeface="inherit"/>
-              </a:rPr>
-              <a:t>  &lt;</a:t>
-            </a:r>
-            <a:r>
-              <a:rPr lang="en-IN" b="0" i="0" dirty="0">
+              <a:t>&lt;form #contactForm="ngForm“ ….</a:t>
+            </a:r>
+          </a:p>
+          <a:p>
+            <a:pPr lvl="2"/>
+            <a:r>
+              <a:rPr lang="en-US" cap="none" dirty="0">
                 <a:solidFill>
                   <a:srgbClr val="000000"/>
                 </a:solidFill>
-                <a:effectLst/>
-                <a:latin typeface="inherit"/>
+                <a:latin typeface="-apple-system"/>
               </a:rPr>
-              <a:t>p</a:t>
-            </a:r>
-            <a:r>
-              <a:rPr lang="en-IN" b="0" i="0" dirty="0">
+              <a:t>Creates a top-level </a:t>
+            </a:r>
+            <a:r>
+              <a:rPr lang="en-US" cap="none" dirty="0" err="1">
                 <a:solidFill>
-                  <a:srgbClr val="006FE0"/>
+                  <a:srgbClr val="000000"/>
                 </a:solidFill>
-                <a:effectLst/>
-                <a:latin typeface="inherit"/>
+                <a:latin typeface="-apple-system"/>
               </a:rPr>
-              <a:t>&gt;</a:t>
-            </a:r>
-            <a:endParaRPr lang="en-IN" b="0" i="0" dirty="0">
+              <a:t>FormGroup</a:t>
+            </a:r>
+            <a:r>
+              <a:rPr lang="en-US" cap="none" dirty="0">
+                <a:solidFill>
+                  <a:srgbClr val="000000"/>
+                </a:solidFill>
+                <a:latin typeface="-apple-system"/>
+              </a:rPr>
+              <a:t> instance</a:t>
+            </a:r>
+          </a:p>
+          <a:p>
+            <a:pPr lvl="2"/>
+            <a:r>
+              <a:rPr lang="en-US" cap="none" dirty="0">
+                <a:solidFill>
+                  <a:srgbClr val="000000"/>
+                </a:solidFill>
+                <a:latin typeface="-apple-system"/>
+              </a:rPr>
+              <a:t>We have access to the </a:t>
+            </a:r>
+            <a:r>
+              <a:rPr lang="en-US" cap="none" dirty="0" err="1">
+                <a:solidFill>
+                  <a:srgbClr val="000000"/>
+                </a:solidFill>
+                <a:latin typeface="-apple-system"/>
+              </a:rPr>
+              <a:t>ngForm</a:t>
+            </a:r>
+            <a:r>
+              <a:rPr lang="en-US" cap="none" dirty="0">
+                <a:solidFill>
+                  <a:srgbClr val="000000"/>
+                </a:solidFill>
+                <a:latin typeface="-apple-system"/>
+              </a:rPr>
+              <a:t> instance via the local template variable</a:t>
+            </a:r>
+            <a:endParaRPr lang="en-IN" cap="none" dirty="0">
               <a:solidFill>
                 <a:srgbClr val="000000"/>
               </a:solidFill>
-              <a:effectLst/>
-              <a:latin typeface="Consolas" panose="020B0609020204030204" pitchFamily="49" charset="0"/>
+              <a:latin typeface="-apple-system"/>
             </a:endParaRPr>
           </a:p>
           <a:p>
-            <a:pPr marL="0" indent="0" algn="l" fontAlgn="base">
-              <a:buNone/>
-            </a:pPr>
-            <a:r>
-              <a:rPr lang="en-IN" b="0" i="0" dirty="0">
-                <a:solidFill>
-                  <a:srgbClr val="006FE0"/>
-                </a:solidFill>
-                <a:effectLst/>
-                <a:latin typeface="inherit"/>
-              </a:rPr>
-              <a:t>    &lt;</a:t>
-            </a:r>
-            <a:r>
-              <a:rPr lang="en-IN" b="0" i="0" dirty="0">
-                <a:solidFill>
-                  <a:srgbClr val="008080"/>
-                </a:solidFill>
-                <a:effectLst/>
-                <a:latin typeface="inherit"/>
-              </a:rPr>
-              <a:t>label </a:t>
-            </a:r>
-            <a:r>
-              <a:rPr lang="en-IN" b="1" i="0" dirty="0">
+            <a:pPr lvl="1"/>
+            <a:r>
+              <a:rPr lang="en-US" sz="1600" cap="none" dirty="0">
                 <a:solidFill>
                   <a:srgbClr val="000000"/>
                 </a:solidFill>
-                <a:effectLst/>
-                <a:latin typeface="inherit"/>
+                <a:latin typeface="-apple-system"/>
               </a:rPr>
-              <a:t>for</a:t>
-            </a:r>
-            <a:r>
-              <a:rPr lang="en-IN" b="0" i="0" dirty="0">
+              <a:t>&lt;input type="text" name="</a:t>
+            </a:r>
+            <a:r>
+              <a:rPr lang="en-US" sz="1600" cap="none" dirty="0" err="1">
                 <a:solidFill>
                   <a:srgbClr val="000000"/>
                 </a:solidFill>
-                <a:effectLst/>
-                <a:latin typeface="Consolas" panose="020B0609020204030204" pitchFamily="49" charset="0"/>
-              </a:rPr>
-              <a:t>=</a:t>
-            </a:r>
-            <a:r>
-              <a:rPr lang="en-IN" b="0" i="0" dirty="0">
-                <a:solidFill>
-                  <a:srgbClr val="DD1144"/>
-                </a:solidFill>
-                <a:effectLst/>
-                <a:latin typeface="inherit"/>
-              </a:rPr>
-              <a:t>"</a:t>
-            </a:r>
-            <a:r>
-              <a:rPr lang="en-IN" b="0" i="0" dirty="0" err="1">
-                <a:solidFill>
-                  <a:srgbClr val="DD1144"/>
-                </a:solidFill>
-                <a:effectLst/>
-                <a:latin typeface="inherit"/>
+                <a:latin typeface="-apple-system"/>
               </a:rPr>
               <a:t>firstname</a:t>
             </a:r>
             <a:r>
-              <a:rPr lang="en-IN" b="0" i="0" dirty="0">
-                <a:solidFill>
-                  <a:srgbClr val="DD1144"/>
-                </a:solidFill>
-                <a:effectLst/>
-                <a:latin typeface="inherit"/>
-              </a:rPr>
-              <a:t>"</a:t>
-            </a:r>
-            <a:r>
-              <a:rPr lang="en-IN" b="0" i="0" dirty="0">
-                <a:solidFill>
-                  <a:srgbClr val="006FE0"/>
-                </a:solidFill>
-                <a:effectLst/>
-                <a:latin typeface="inherit"/>
-              </a:rPr>
-              <a:t>&gt;</a:t>
-            </a:r>
-            <a:r>
-              <a:rPr lang="en-IN" b="0" i="0" dirty="0">
-                <a:solidFill>
-                  <a:srgbClr val="008080"/>
-                </a:solidFill>
-                <a:effectLst/>
-                <a:latin typeface="inherit"/>
-              </a:rPr>
-              <a:t>First </a:t>
-            </a:r>
-            <a:r>
-              <a:rPr lang="en-IN" b="0" i="0" dirty="0">
+              <a:rPr lang="en-US" sz="1600" cap="none" dirty="0">
                 <a:solidFill>
                   <a:srgbClr val="000000"/>
                 </a:solidFill>
-                <a:effectLst/>
-                <a:latin typeface="inherit"/>
+                <a:latin typeface="-apple-system"/>
               </a:rPr>
-              <a:t>Name</a:t>
-            </a:r>
-            <a:r>
-              <a:rPr lang="en-IN" b="0" i="0" dirty="0">
-                <a:solidFill>
-                  <a:srgbClr val="006FE0"/>
-                </a:solidFill>
-                <a:effectLst/>
-                <a:latin typeface="inherit"/>
-              </a:rPr>
-              <a:t>&lt;</a:t>
-            </a:r>
-            <a:r>
-              <a:rPr lang="en-IN" b="0" i="0" dirty="0">
+              <a:t>" </a:t>
+            </a:r>
+            <a:r>
+              <a:rPr lang="en-US" sz="1600" cap="none" dirty="0" err="1">
                 <a:solidFill>
                   <a:srgbClr val="000000"/>
                 </a:solidFill>
-                <a:effectLst/>
-                <a:latin typeface="Consolas" panose="020B0609020204030204" pitchFamily="49" charset="0"/>
+                <a:latin typeface="-apple-system"/>
               </a:rPr>
-              <a:t>/</a:t>
-            </a:r>
-            <a:r>
-              <a:rPr lang="en-IN" b="0" i="0" dirty="0">
+              <a:t>ngModel</a:t>
+            </a:r>
+            <a:r>
+              <a:rPr lang="en-US" sz="1600" cap="none" dirty="0">
                 <a:solidFill>
                   <a:srgbClr val="000000"/>
                 </a:solidFill>
-                <a:effectLst/>
-                <a:latin typeface="inherit"/>
-              </a:rPr>
-              <a:t>label</a:t>
-            </a:r>
-            <a:r>
-              <a:rPr lang="en-IN" b="0" i="0" dirty="0">
-                <a:solidFill>
-                  <a:srgbClr val="006FE0"/>
-                </a:solidFill>
-                <a:effectLst/>
-                <a:latin typeface="inherit"/>
+                <a:latin typeface="-apple-system"/>
               </a:rPr>
               <a:t>&gt;</a:t>
             </a:r>
-            <a:endParaRPr lang="en-IN" b="0" i="0" dirty="0">
+            <a:endParaRPr lang="en-IN" sz="1600" cap="none" dirty="0">
               <a:solidFill>
                 <a:srgbClr val="000000"/>
               </a:solidFill>
-              <a:effectLst/>
-              <a:latin typeface="Consolas" panose="020B0609020204030204" pitchFamily="49" charset="0"/>
+              <a:latin typeface="-apple-system"/>
             </a:endParaRPr>
           </a:p>
           <a:p>
-            <a:pPr marL="0" indent="0" algn="l" fontAlgn="base">
-              <a:buNone/>
-            </a:pPr>
-            <a:r>
-              <a:rPr lang="en-IN" b="0" i="0" dirty="0">
-                <a:solidFill>
-                  <a:srgbClr val="006FE0"/>
-                </a:solidFill>
-                <a:effectLst/>
-                <a:latin typeface="inherit"/>
-              </a:rPr>
-              <a:t>    &lt;</a:t>
-            </a:r>
-            <a:r>
-              <a:rPr lang="en-IN" b="0" i="0" dirty="0">
-                <a:solidFill>
-                  <a:srgbClr val="008080"/>
-                </a:solidFill>
-                <a:effectLst/>
-                <a:latin typeface="inherit"/>
-              </a:rPr>
-              <a:t>input </a:t>
-            </a:r>
-            <a:r>
-              <a:rPr lang="en-IN" b="0" i="0" dirty="0">
+            <a:pPr lvl="2"/>
+            <a:r>
+              <a:rPr lang="en-US" sz="1800" cap="none" dirty="0" err="1">
                 <a:solidFill>
                   <a:srgbClr val="000000"/>
                 </a:solidFill>
-                <a:effectLst/>
-                <a:latin typeface="inherit"/>
+                <a:latin typeface="-apple-system"/>
               </a:rPr>
-              <a:t>type</a:t>
-            </a:r>
-            <a:r>
-              <a:rPr lang="en-IN" b="0" i="0" dirty="0">
+              <a:t>ngModel</a:t>
+            </a:r>
+            <a:r>
+              <a:rPr lang="en-US" sz="1800" cap="none" dirty="0">
                 <a:solidFill>
                   <a:srgbClr val="000000"/>
                 </a:solidFill>
-                <a:effectLst/>
-                <a:latin typeface="Consolas" panose="020B0609020204030204" pitchFamily="49" charset="0"/>
+                <a:latin typeface="-apple-system"/>
               </a:rPr>
-              <a:t>=</a:t>
-            </a:r>
-            <a:r>
-              <a:rPr lang="en-IN" b="0" i="0" dirty="0">
-                <a:solidFill>
-                  <a:srgbClr val="DD1144"/>
-                </a:solidFill>
-                <a:effectLst/>
-                <a:latin typeface="inherit"/>
-              </a:rPr>
-              <a:t>"text"</a:t>
-            </a:r>
-            <a:r>
-              <a:rPr lang="en-IN" b="0" i="0" dirty="0">
-                <a:solidFill>
-                  <a:srgbClr val="006FE0"/>
-                </a:solidFill>
-                <a:effectLst/>
-                <a:latin typeface="inherit"/>
-              </a:rPr>
-              <a:t> </a:t>
-            </a:r>
-            <a:r>
-              <a:rPr lang="en-IN" b="0" i="0" dirty="0">
+              <a:t> will use the name attribute to create the </a:t>
+            </a:r>
+            <a:r>
+              <a:rPr lang="en-US" sz="1800" cap="none" dirty="0" err="1">
                 <a:solidFill>
                   <a:srgbClr val="000000"/>
                 </a:solidFill>
-                <a:effectLst/>
-                <a:latin typeface="inherit"/>
+                <a:latin typeface="-apple-system"/>
               </a:rPr>
-              <a:t>name</a:t>
-            </a:r>
-            <a:r>
-              <a:rPr lang="en-IN" b="0" i="0" dirty="0">
+              <a:t>FormControl</a:t>
+            </a:r>
+            <a:r>
+              <a:rPr lang="en-US" sz="1800" cap="none" dirty="0">
                 <a:solidFill>
                   <a:srgbClr val="000000"/>
                 </a:solidFill>
-                <a:effectLst/>
-                <a:latin typeface="Consolas" panose="020B0609020204030204" pitchFamily="49" charset="0"/>
+                <a:latin typeface="-apple-system"/>
               </a:rPr>
-              <a:t>=</a:t>
-            </a:r>
-            <a:r>
-              <a:rPr lang="en-IN" b="0" i="0" dirty="0">
-                <a:solidFill>
-                  <a:srgbClr val="DD1144"/>
-                </a:solidFill>
-                <a:effectLst/>
-                <a:latin typeface="inherit"/>
-              </a:rPr>
-              <a:t>"</a:t>
-            </a:r>
-            <a:r>
-              <a:rPr lang="en-IN" b="0" i="0" dirty="0" err="1">
-                <a:solidFill>
-                  <a:srgbClr val="DD1144"/>
-                </a:solidFill>
-                <a:effectLst/>
-                <a:latin typeface="inherit"/>
-              </a:rPr>
-              <a:t>firstname</a:t>
-            </a:r>
-            <a:r>
-              <a:rPr lang="en-IN" b="0" i="0" dirty="0">
-                <a:solidFill>
-                  <a:srgbClr val="DD1144"/>
-                </a:solidFill>
-                <a:effectLst/>
-                <a:latin typeface="inherit"/>
-              </a:rPr>
-              <a:t>"</a:t>
-            </a:r>
-            <a:r>
-              <a:rPr lang="en-IN" b="0" i="0" dirty="0">
-                <a:solidFill>
-                  <a:srgbClr val="006FE0"/>
-                </a:solidFill>
-                <a:effectLst/>
-                <a:latin typeface="inherit"/>
-              </a:rPr>
-              <a:t> </a:t>
-            </a:r>
-            <a:r>
-              <a:rPr lang="en-IN" b="0" i="0" dirty="0" err="1">
-                <a:solidFill>
-                  <a:srgbClr val="000000"/>
-                </a:solidFill>
-                <a:effectLst/>
-                <a:latin typeface="inherit"/>
-              </a:rPr>
-              <a:t>ngModel</a:t>
-            </a:r>
-            <a:r>
-              <a:rPr lang="en-IN" b="0" i="0" dirty="0">
-                <a:solidFill>
-                  <a:srgbClr val="006FE0"/>
-                </a:solidFill>
-                <a:effectLst/>
-                <a:latin typeface="inherit"/>
-              </a:rPr>
-              <a:t>&gt;</a:t>
-            </a:r>
-            <a:endParaRPr lang="en-IN" b="0" i="0" dirty="0">
+              <a:t> instance for each of the Form field it is attached.</a:t>
+            </a:r>
+            <a:endParaRPr lang="en-IN" sz="1800" cap="none" dirty="0">
               <a:solidFill>
                 <a:srgbClr val="000000"/>
               </a:solidFill>
-              <a:effectLst/>
-              <a:latin typeface="Consolas" panose="020B0609020204030204" pitchFamily="49" charset="0"/>
+              <a:latin typeface="-apple-system"/>
             </a:endParaRPr>
           </a:p>
           <a:p>
-            <a:pPr marL="0" indent="0" algn="l" fontAlgn="base">
-              <a:buNone/>
-            </a:pPr>
-            <a:r>
-              <a:rPr lang="en-IN" b="0" i="0" dirty="0">
-                <a:solidFill>
-                  <a:srgbClr val="006FE0"/>
-                </a:solidFill>
-                <a:effectLst/>
-                <a:latin typeface="inherit"/>
-              </a:rPr>
-              <a:t>  &lt;</a:t>
-            </a:r>
-            <a:r>
-              <a:rPr lang="en-IN" b="0" i="0" dirty="0">
-                <a:solidFill>
-                  <a:srgbClr val="000000"/>
-                </a:solidFill>
-                <a:effectLst/>
-                <a:latin typeface="Consolas" panose="020B0609020204030204" pitchFamily="49" charset="0"/>
-              </a:rPr>
-              <a:t>/</a:t>
-            </a:r>
-            <a:r>
-              <a:rPr lang="en-IN" b="0" i="0" dirty="0">
-                <a:solidFill>
-                  <a:srgbClr val="000000"/>
-                </a:solidFill>
-                <a:effectLst/>
-                <a:latin typeface="inherit"/>
-              </a:rPr>
-              <a:t>p</a:t>
-            </a:r>
-            <a:r>
-              <a:rPr lang="en-IN" b="0" i="0" dirty="0">
-                <a:solidFill>
-                  <a:srgbClr val="006FE0"/>
-                </a:solidFill>
-                <a:effectLst/>
-                <a:latin typeface="inherit"/>
-              </a:rPr>
-              <a:t>&gt;</a:t>
-            </a:r>
-            <a:endParaRPr lang="en-IN" b="0" i="0" dirty="0">
-              <a:solidFill>
-                <a:srgbClr val="000000"/>
-              </a:solidFill>
-              <a:effectLst/>
-              <a:latin typeface="Consolas" panose="020B0609020204030204" pitchFamily="49" charset="0"/>
-            </a:endParaRPr>
-          </a:p>
-          <a:p>
-            <a:pPr marL="0" indent="0" algn="l" fontAlgn="base">
-              <a:buNone/>
-            </a:pPr>
-            <a:r>
-              <a:rPr lang="en-IN" b="0" i="0" dirty="0">
-                <a:solidFill>
-                  <a:srgbClr val="000000"/>
-                </a:solidFill>
-                <a:effectLst/>
-                <a:latin typeface="Consolas" panose="020B0609020204030204" pitchFamily="49" charset="0"/>
-              </a:rPr>
-              <a:t> </a:t>
-            </a:r>
-          </a:p>
-          <a:p>
-            <a:pPr marL="0" indent="0" algn="l" fontAlgn="base">
-              <a:buNone/>
-            </a:pPr>
-            <a:r>
-              <a:rPr lang="en-IN" b="0" i="0" dirty="0">
-                <a:solidFill>
-                  <a:srgbClr val="006FE0"/>
-                </a:solidFill>
-                <a:effectLst/>
-                <a:latin typeface="inherit"/>
-              </a:rPr>
-              <a:t>  &lt;</a:t>
-            </a:r>
-            <a:r>
-              <a:rPr lang="en-IN" b="0" i="0" dirty="0">
-                <a:solidFill>
-                  <a:srgbClr val="000000"/>
-                </a:solidFill>
-                <a:effectLst/>
-                <a:latin typeface="inherit"/>
-              </a:rPr>
-              <a:t>p</a:t>
-            </a:r>
-            <a:r>
-              <a:rPr lang="en-IN" b="0" i="0" dirty="0">
-                <a:solidFill>
-                  <a:srgbClr val="006FE0"/>
-                </a:solidFill>
-                <a:effectLst/>
-                <a:latin typeface="inherit"/>
-              </a:rPr>
-              <a:t>&gt;</a:t>
-            </a:r>
-            <a:endParaRPr lang="en-IN" b="0" i="0" dirty="0">
-              <a:solidFill>
-                <a:srgbClr val="000000"/>
-              </a:solidFill>
-              <a:effectLst/>
-              <a:latin typeface="Consolas" panose="020B0609020204030204" pitchFamily="49" charset="0"/>
-            </a:endParaRPr>
-          </a:p>
-          <a:p>
-            <a:pPr marL="0" indent="0" algn="l" fontAlgn="base">
-              <a:buNone/>
-            </a:pPr>
-            <a:r>
-              <a:rPr lang="en-IN" b="0" i="0" dirty="0">
-                <a:solidFill>
-                  <a:srgbClr val="006FE0"/>
-                </a:solidFill>
-                <a:effectLst/>
-                <a:latin typeface="inherit"/>
-              </a:rPr>
-              <a:t>    &lt;</a:t>
-            </a:r>
-            <a:r>
-              <a:rPr lang="en-IN" b="0" i="0" dirty="0">
-                <a:solidFill>
-                  <a:srgbClr val="008080"/>
-                </a:solidFill>
-                <a:effectLst/>
-                <a:latin typeface="inherit"/>
-              </a:rPr>
-              <a:t>label </a:t>
-            </a:r>
-            <a:r>
-              <a:rPr lang="en-IN" b="1" i="0" dirty="0">
-                <a:solidFill>
-                  <a:srgbClr val="000000"/>
-                </a:solidFill>
-                <a:effectLst/>
-                <a:latin typeface="inherit"/>
-              </a:rPr>
-              <a:t>for</a:t>
-            </a:r>
-            <a:r>
-              <a:rPr lang="en-IN" b="0" i="0" dirty="0">
-                <a:solidFill>
-                  <a:srgbClr val="000000"/>
-                </a:solidFill>
-                <a:effectLst/>
-                <a:latin typeface="Consolas" panose="020B0609020204030204" pitchFamily="49" charset="0"/>
-              </a:rPr>
-              <a:t>=</a:t>
-            </a:r>
-            <a:r>
-              <a:rPr lang="en-IN" b="0" i="0" dirty="0">
-                <a:solidFill>
-                  <a:srgbClr val="DD1144"/>
-                </a:solidFill>
-                <a:effectLst/>
-                <a:latin typeface="inherit"/>
-              </a:rPr>
-              <a:t>"</a:t>
-            </a:r>
-            <a:r>
-              <a:rPr lang="en-IN" b="0" i="0" dirty="0" err="1">
-                <a:solidFill>
-                  <a:srgbClr val="DD1144"/>
-                </a:solidFill>
-                <a:effectLst/>
-                <a:latin typeface="inherit"/>
-              </a:rPr>
-              <a:t>lastname</a:t>
-            </a:r>
-            <a:r>
-              <a:rPr lang="en-IN" b="0" i="0" dirty="0">
-                <a:solidFill>
-                  <a:srgbClr val="DD1144"/>
-                </a:solidFill>
-                <a:effectLst/>
-                <a:latin typeface="inherit"/>
-              </a:rPr>
-              <a:t>"</a:t>
-            </a:r>
-            <a:r>
-              <a:rPr lang="en-IN" b="0" i="0" dirty="0">
-                <a:solidFill>
-                  <a:srgbClr val="006FE0"/>
-                </a:solidFill>
-                <a:effectLst/>
-                <a:latin typeface="inherit"/>
-              </a:rPr>
-              <a:t>&gt;</a:t>
-            </a:r>
-            <a:r>
-              <a:rPr lang="en-IN" b="0" i="0" dirty="0">
-                <a:solidFill>
-                  <a:srgbClr val="008080"/>
-                </a:solidFill>
-                <a:effectLst/>
-                <a:latin typeface="inherit"/>
-              </a:rPr>
-              <a:t>Last </a:t>
-            </a:r>
-            <a:r>
-              <a:rPr lang="en-IN" b="0" i="0" dirty="0">
-                <a:solidFill>
-                  <a:srgbClr val="000000"/>
-                </a:solidFill>
-                <a:effectLst/>
-                <a:latin typeface="inherit"/>
-              </a:rPr>
-              <a:t>Name</a:t>
-            </a:r>
-            <a:r>
-              <a:rPr lang="en-IN" b="0" i="0" dirty="0">
-                <a:solidFill>
-                  <a:srgbClr val="006FE0"/>
-                </a:solidFill>
-                <a:effectLst/>
-                <a:latin typeface="inherit"/>
-              </a:rPr>
-              <a:t>&lt;</a:t>
-            </a:r>
-            <a:r>
-              <a:rPr lang="en-IN" b="0" i="0" dirty="0">
-                <a:solidFill>
-                  <a:srgbClr val="000000"/>
-                </a:solidFill>
-                <a:effectLst/>
-                <a:latin typeface="Consolas" panose="020B0609020204030204" pitchFamily="49" charset="0"/>
-              </a:rPr>
-              <a:t>/</a:t>
-            </a:r>
-            <a:r>
-              <a:rPr lang="en-IN" b="0" i="0" dirty="0">
-                <a:solidFill>
-                  <a:srgbClr val="000000"/>
-                </a:solidFill>
-                <a:effectLst/>
-                <a:latin typeface="inherit"/>
-              </a:rPr>
-              <a:t>label</a:t>
-            </a:r>
-            <a:r>
-              <a:rPr lang="en-IN" b="0" i="0" dirty="0">
-                <a:solidFill>
-                  <a:srgbClr val="006FE0"/>
-                </a:solidFill>
-                <a:effectLst/>
-                <a:latin typeface="inherit"/>
-              </a:rPr>
-              <a:t>&gt;</a:t>
-            </a:r>
-            <a:endParaRPr lang="en-IN" b="0" i="0" dirty="0">
-              <a:solidFill>
-                <a:srgbClr val="000000"/>
-              </a:solidFill>
-              <a:effectLst/>
-              <a:latin typeface="Consolas" panose="020B0609020204030204" pitchFamily="49" charset="0"/>
-            </a:endParaRPr>
-          </a:p>
-          <a:p>
-            <a:pPr marL="0" indent="0" algn="l" fontAlgn="base">
-              <a:buNone/>
-            </a:pPr>
-            <a:r>
-              <a:rPr lang="en-IN" b="0" i="0" dirty="0">
-                <a:solidFill>
-                  <a:srgbClr val="006FE0"/>
-                </a:solidFill>
-                <a:effectLst/>
-                <a:latin typeface="inherit"/>
-              </a:rPr>
-              <a:t>    &lt;</a:t>
-            </a:r>
-            <a:r>
-              <a:rPr lang="en-IN" b="0" i="0" dirty="0">
-                <a:solidFill>
-                  <a:srgbClr val="008080"/>
-                </a:solidFill>
-                <a:effectLst/>
-                <a:latin typeface="inherit"/>
-              </a:rPr>
-              <a:t>input </a:t>
-            </a:r>
-            <a:r>
-              <a:rPr lang="en-IN" b="0" i="0" dirty="0">
-                <a:solidFill>
-                  <a:srgbClr val="000000"/>
-                </a:solidFill>
-                <a:effectLst/>
-                <a:latin typeface="inherit"/>
-              </a:rPr>
-              <a:t>type</a:t>
-            </a:r>
-            <a:r>
-              <a:rPr lang="en-IN" b="0" i="0" dirty="0">
-                <a:solidFill>
-                  <a:srgbClr val="000000"/>
-                </a:solidFill>
-                <a:effectLst/>
-                <a:latin typeface="Consolas" panose="020B0609020204030204" pitchFamily="49" charset="0"/>
-              </a:rPr>
-              <a:t>=</a:t>
-            </a:r>
-            <a:r>
-              <a:rPr lang="en-IN" b="0" i="0" dirty="0">
-                <a:solidFill>
-                  <a:srgbClr val="DD1144"/>
-                </a:solidFill>
-                <a:effectLst/>
-                <a:latin typeface="inherit"/>
-              </a:rPr>
-              <a:t>"text"</a:t>
-            </a:r>
-            <a:r>
-              <a:rPr lang="en-IN" b="0" i="0" dirty="0">
-                <a:solidFill>
-                  <a:srgbClr val="006FE0"/>
-                </a:solidFill>
-                <a:effectLst/>
-                <a:latin typeface="inherit"/>
-              </a:rPr>
-              <a:t> </a:t>
-            </a:r>
-            <a:r>
-              <a:rPr lang="en-IN" b="0" i="0" dirty="0">
-                <a:solidFill>
-                  <a:srgbClr val="000000"/>
-                </a:solidFill>
-                <a:effectLst/>
-                <a:latin typeface="inherit"/>
-              </a:rPr>
-              <a:t>name</a:t>
-            </a:r>
-            <a:r>
-              <a:rPr lang="en-IN" b="0" i="0" dirty="0">
-                <a:solidFill>
-                  <a:srgbClr val="000000"/>
-                </a:solidFill>
-                <a:effectLst/>
-                <a:latin typeface="Consolas" panose="020B0609020204030204" pitchFamily="49" charset="0"/>
-              </a:rPr>
-              <a:t>=</a:t>
-            </a:r>
-            <a:r>
-              <a:rPr lang="en-IN" b="0" i="0" dirty="0">
-                <a:solidFill>
-                  <a:srgbClr val="DD1144"/>
-                </a:solidFill>
-                <a:effectLst/>
-                <a:latin typeface="inherit"/>
-              </a:rPr>
-              <a:t>"</a:t>
-            </a:r>
-            <a:r>
-              <a:rPr lang="en-IN" b="0" i="0" dirty="0" err="1">
-                <a:solidFill>
-                  <a:srgbClr val="DD1144"/>
-                </a:solidFill>
-                <a:effectLst/>
-                <a:latin typeface="inherit"/>
-              </a:rPr>
-              <a:t>lastname</a:t>
-            </a:r>
-            <a:r>
-              <a:rPr lang="en-IN" b="0" i="0" dirty="0">
-                <a:solidFill>
-                  <a:srgbClr val="DD1144"/>
-                </a:solidFill>
-                <a:effectLst/>
-                <a:latin typeface="inherit"/>
-              </a:rPr>
-              <a:t>"</a:t>
-            </a:r>
-            <a:r>
-              <a:rPr lang="en-IN" b="0" i="0" dirty="0">
-                <a:solidFill>
-                  <a:srgbClr val="006FE0"/>
-                </a:solidFill>
-                <a:effectLst/>
-                <a:latin typeface="inherit"/>
-              </a:rPr>
-              <a:t> </a:t>
-            </a:r>
-            <a:r>
-              <a:rPr lang="en-IN" b="0" i="0" dirty="0" err="1">
-                <a:solidFill>
-                  <a:srgbClr val="000000"/>
-                </a:solidFill>
-                <a:effectLst/>
-                <a:latin typeface="inherit"/>
-              </a:rPr>
-              <a:t>ngModel</a:t>
-            </a:r>
-            <a:r>
-              <a:rPr lang="en-IN" b="0" i="0" dirty="0">
-                <a:solidFill>
-                  <a:srgbClr val="006FE0"/>
-                </a:solidFill>
-                <a:effectLst/>
-                <a:latin typeface="inherit"/>
-              </a:rPr>
-              <a:t>&gt;</a:t>
-            </a:r>
-            <a:endParaRPr lang="en-IN" b="0" i="0" dirty="0">
-              <a:solidFill>
-                <a:srgbClr val="000000"/>
-              </a:solidFill>
-              <a:effectLst/>
-              <a:latin typeface="Consolas" panose="020B0609020204030204" pitchFamily="49" charset="0"/>
-            </a:endParaRPr>
-          </a:p>
-          <a:p>
-            <a:pPr marL="0" indent="0" algn="l" fontAlgn="base">
-              <a:buNone/>
-            </a:pPr>
-            <a:r>
-              <a:rPr lang="en-IN" b="0" i="0" dirty="0">
-                <a:solidFill>
-                  <a:srgbClr val="006FE0"/>
-                </a:solidFill>
-                <a:effectLst/>
-                <a:latin typeface="inherit"/>
-              </a:rPr>
-              <a:t>  &lt;</a:t>
-            </a:r>
-            <a:r>
-              <a:rPr lang="en-IN" b="0" i="0" dirty="0">
-                <a:solidFill>
-                  <a:srgbClr val="000000"/>
-                </a:solidFill>
-                <a:effectLst/>
-                <a:latin typeface="Consolas" panose="020B0609020204030204" pitchFamily="49" charset="0"/>
-              </a:rPr>
-              <a:t>/</a:t>
-            </a:r>
-            <a:r>
-              <a:rPr lang="en-IN" b="0" i="0" dirty="0">
-                <a:solidFill>
-                  <a:srgbClr val="000000"/>
-                </a:solidFill>
-                <a:effectLst/>
-                <a:latin typeface="inherit"/>
-              </a:rPr>
-              <a:t>p</a:t>
-            </a:r>
-            <a:r>
-              <a:rPr lang="en-IN" b="0" i="0" dirty="0">
-                <a:solidFill>
-                  <a:srgbClr val="006FE0"/>
-                </a:solidFill>
-                <a:effectLst/>
-                <a:latin typeface="inherit"/>
-              </a:rPr>
-              <a:t>&gt;</a:t>
-            </a:r>
-            <a:endParaRPr lang="en-IN" b="0" i="0" dirty="0">
-              <a:solidFill>
-                <a:srgbClr val="000000"/>
-              </a:solidFill>
-              <a:effectLst/>
-              <a:latin typeface="Consolas" panose="020B0609020204030204" pitchFamily="49" charset="0"/>
-            </a:endParaRPr>
-          </a:p>
-          <a:p>
-            <a:pPr marL="0" indent="0">
-              <a:buNone/>
-            </a:pPr>
             <a:endParaRPr lang="en-IN" dirty="0"/>
           </a:p>
         </p:txBody>
       </p:sp>
       <p:pic>
         <p:nvPicPr>
-          <p:cNvPr id="9" name="Picture 8">
+          <p:cNvPr id="5" name="Picture 4">
             <a:extLst>
               <a:ext uri="{FF2B5EF4-FFF2-40B4-BE49-F238E27FC236}">
-                <a16:creationId xmlns:a16="http://schemas.microsoft.com/office/drawing/2014/main" id="{D0A3F993-344C-4CBD-BC1D-D40562E0458F}"/>
+                <a16:creationId xmlns:a16="http://schemas.microsoft.com/office/drawing/2014/main" id="{178B3147-579D-4A42-8F7C-3C3B020233DE}"/>
               </a:ext>
             </a:extLst>
           </p:cNvPr>
@@ -10053,8 +9309,8 @@
         </p:blipFill>
         <p:spPr>
           <a:xfrm>
-            <a:off x="870100" y="1488344"/>
-            <a:ext cx="10451174" cy="5181601"/>
+            <a:off x="913774" y="557837"/>
+            <a:ext cx="10199148" cy="3618510"/>
           </a:xfrm>
           <a:prstGeom prst="rect">
             <a:avLst/>
@@ -10064,7 +9320,7 @@
     </p:spTree>
     <p:extLst>
       <p:ext uri="{BB962C8B-B14F-4D97-AF65-F5344CB8AC3E}">
-        <p14:creationId xmlns:p14="http://schemas.microsoft.com/office/powerpoint/2010/main" val="1028022205"/>
+        <p14:creationId xmlns:p14="http://schemas.microsoft.com/office/powerpoint/2010/main" val="360901399"/>
       </p:ext>
     </p:extLst>
   </p:cSld>
@@ -10169,7 +9425,7 @@
         </p:nvSpPr>
         <p:spPr>
           <a:xfrm>
-            <a:off x="913774" y="161315"/>
+            <a:off x="913149" y="63661"/>
             <a:ext cx="10364451" cy="1596177"/>
           </a:xfrm>
         </p:spPr>
@@ -10178,265 +9434,43 @@
           <a:lstStyle/>
           <a:p>
             <a:r>
-              <a:rPr lang="en-US" dirty="0"/>
+              <a:rPr lang="en-US" b="1" dirty="0"/>
               <a:t>Working with Reactive forms</a:t>
             </a:r>
-            <a:endParaRPr lang="en-IN" dirty="0"/>
-          </a:p>
-        </p:txBody>
-      </p:sp>
-      <p:sp>
-        <p:nvSpPr>
-          <p:cNvPr id="3" name="Content Placeholder 2">
+            <a:endParaRPr lang="en-IN" b="1" dirty="0"/>
+          </a:p>
+        </p:txBody>
+      </p:sp>
+      <p:pic>
+        <p:nvPicPr>
+          <p:cNvPr id="15" name="Picture 14">
             <a:extLst>
               <a:ext uri="{FF2B5EF4-FFF2-40B4-BE49-F238E27FC236}">
-                <a16:creationId xmlns:a16="http://schemas.microsoft.com/office/drawing/2014/main" id="{AB6E4F1C-5942-4BC4-9E09-80B003D54DAC}"/>
+                <a16:creationId xmlns:a16="http://schemas.microsoft.com/office/drawing/2014/main" id="{782F5477-A8A6-4173-BB72-685EE235DC39}"/>
               </a:ext>
             </a:extLst>
           </p:cNvPr>
-          <p:cNvSpPr>
-            <a:spLocks noGrp="1"/>
-          </p:cNvSpPr>
-          <p:nvPr>
-            <p:ph sz="quarter" idx="13"/>
-          </p:nvPr>
-        </p:nvSpPr>
+          <p:cNvPicPr>
+            <a:picLocks noChangeAspect="1"/>
+          </p:cNvPicPr>
+          <p:nvPr/>
+        </p:nvPicPr>
+        <p:blipFill>
+          <a:blip r:embed="rId2"/>
+          <a:stretch>
+            <a:fillRect/>
+          </a:stretch>
+        </p:blipFill>
         <p:spPr>
           <a:xfrm>
-            <a:off x="913774" y="1757492"/>
-            <a:ext cx="10363826" cy="4169175"/>
+            <a:off x="2344962" y="1216241"/>
+            <a:ext cx="7653883" cy="5339918"/>
           </a:xfrm>
+          <a:prstGeom prst="rect">
+            <a:avLst/>
+          </a:prstGeom>
         </p:spPr>
-        <p:txBody>
-          <a:bodyPr>
-            <a:normAutofit/>
-          </a:bodyPr>
-          <a:lstStyle/>
-          <a:p>
-            <a:r>
-              <a:rPr lang="en-IN" b="1" i="0" dirty="0">
-                <a:solidFill>
-                  <a:srgbClr val="000000"/>
-                </a:solidFill>
-                <a:effectLst/>
-                <a:latin typeface="-apple-system"/>
-              </a:rPr>
-              <a:t>Import Forms Module</a:t>
-            </a:r>
-          </a:p>
-          <a:p>
-            <a:pPr marL="685800" lvl="2">
-              <a:spcBef>
-                <a:spcPts val="1000"/>
-              </a:spcBef>
-            </a:pPr>
-            <a:r>
-              <a:rPr lang="en-US" cap="none" dirty="0">
-                <a:solidFill>
-                  <a:srgbClr val="000000"/>
-                </a:solidFill>
-                <a:latin typeface="-apple-system"/>
-              </a:rPr>
-              <a:t>import { </a:t>
-            </a:r>
-            <a:r>
-              <a:rPr lang="en-US" cap="none" dirty="0" err="1">
-                <a:solidFill>
-                  <a:srgbClr val="000000"/>
-                </a:solidFill>
-                <a:latin typeface="-apple-system"/>
-              </a:rPr>
-              <a:t>ReactiveFormsModule</a:t>
-            </a:r>
-            <a:r>
-              <a:rPr lang="en-US" cap="none" dirty="0">
-                <a:solidFill>
-                  <a:srgbClr val="000000"/>
-                </a:solidFill>
-                <a:latin typeface="-apple-system"/>
-              </a:rPr>
-              <a:t> } from '@angular/forms';</a:t>
-            </a:r>
-            <a:r>
-              <a:rPr lang="en-IN" cap="none" dirty="0">
-                <a:solidFill>
-                  <a:srgbClr val="000000"/>
-                </a:solidFill>
-                <a:latin typeface="-apple-system"/>
-              </a:rPr>
-              <a:t>imports: [</a:t>
-            </a:r>
-          </a:p>
-          <a:p>
-            <a:pPr marL="457200" lvl="1" indent="0">
-              <a:buNone/>
-            </a:pPr>
-            <a:r>
-              <a:rPr lang="en-IN" sz="1600" cap="none" dirty="0">
-                <a:solidFill>
-                  <a:srgbClr val="000000"/>
-                </a:solidFill>
-                <a:latin typeface="-apple-system"/>
-              </a:rPr>
-              <a:t>	   …..</a:t>
-            </a:r>
-          </a:p>
-          <a:p>
-            <a:pPr marL="457200" lvl="1" indent="0">
-              <a:buNone/>
-            </a:pPr>
-            <a:r>
-              <a:rPr lang="en-IN" sz="1600" cap="none" dirty="0">
-                <a:solidFill>
-                  <a:srgbClr val="000000"/>
-                </a:solidFill>
-                <a:latin typeface="-apple-system"/>
-              </a:rPr>
-              <a:t>	  </a:t>
-            </a:r>
-            <a:r>
-              <a:rPr lang="en-US" sz="1800" cap="none" dirty="0">
-                <a:solidFill>
-                  <a:srgbClr val="000000"/>
-                </a:solidFill>
-                <a:latin typeface="-apple-system"/>
-              </a:rPr>
-              <a:t> </a:t>
-            </a:r>
-            <a:r>
-              <a:rPr lang="en-US" sz="1800" cap="none" dirty="0" err="1">
-                <a:solidFill>
-                  <a:srgbClr val="000000"/>
-                </a:solidFill>
-                <a:latin typeface="-apple-system"/>
-              </a:rPr>
-              <a:t>ReactiveFormsModule</a:t>
-            </a:r>
-            <a:endParaRPr lang="en-IN" sz="1600" cap="none" dirty="0">
-              <a:solidFill>
-                <a:srgbClr val="000000"/>
-              </a:solidFill>
-              <a:latin typeface="-apple-system"/>
-            </a:endParaRPr>
-          </a:p>
-          <a:p>
-            <a:pPr marL="457200" lvl="1" indent="0">
-              <a:buNone/>
-            </a:pPr>
-            <a:r>
-              <a:rPr lang="en-IN" sz="1600" cap="none" dirty="0">
-                <a:solidFill>
-                  <a:srgbClr val="000000"/>
-                </a:solidFill>
-                <a:latin typeface="-apple-system"/>
-              </a:rPr>
-              <a:t>	],</a:t>
-            </a:r>
-          </a:p>
-          <a:p>
-            <a:pPr lvl="1"/>
-            <a:r>
-              <a:rPr lang="en-IN" sz="1200" b="1" cap="none" dirty="0" err="1">
-                <a:solidFill>
-                  <a:srgbClr val="000000"/>
-                </a:solidFill>
-                <a:latin typeface="-apple-system"/>
-              </a:rPr>
-              <a:t>FormGroup</a:t>
-            </a:r>
-            <a:endParaRPr lang="en-IN" sz="1200" b="1" cap="none" dirty="0">
-              <a:solidFill>
-                <a:srgbClr val="000000"/>
-              </a:solidFill>
-              <a:latin typeface="-apple-system"/>
-            </a:endParaRPr>
-          </a:p>
-          <a:p>
-            <a:pPr lvl="2"/>
-            <a:r>
-              <a:rPr lang="en-US" sz="1200" cap="none" dirty="0">
-                <a:solidFill>
-                  <a:srgbClr val="000000"/>
-                </a:solidFill>
-                <a:latin typeface="-apple-system"/>
-              </a:rPr>
-              <a:t>represents a collection of form Controls</a:t>
-            </a:r>
-            <a:endParaRPr lang="en-IN" sz="1200" cap="none" dirty="0">
-              <a:solidFill>
-                <a:srgbClr val="000000"/>
-              </a:solidFill>
-              <a:latin typeface="-apple-system"/>
-            </a:endParaRPr>
-          </a:p>
-          <a:p>
-            <a:pPr lvl="1"/>
-            <a:r>
-              <a:rPr lang="en-IN" sz="1200" b="1" cap="none" dirty="0" err="1">
-                <a:solidFill>
-                  <a:srgbClr val="000000"/>
-                </a:solidFill>
-                <a:latin typeface="-apple-system"/>
-              </a:rPr>
-              <a:t>FormControl</a:t>
-            </a:r>
-            <a:endParaRPr lang="en-IN" sz="1200" b="1" cap="none" dirty="0">
-              <a:solidFill>
-                <a:srgbClr val="000000"/>
-              </a:solidFill>
-              <a:latin typeface="-apple-system"/>
-            </a:endParaRPr>
-          </a:p>
-          <a:p>
-            <a:pPr lvl="2"/>
-            <a:r>
-              <a:rPr lang="en-US" sz="1200" cap="none" dirty="0">
-                <a:solidFill>
-                  <a:srgbClr val="000000"/>
-                </a:solidFill>
-                <a:latin typeface="-apple-system"/>
-              </a:rPr>
-              <a:t>Encapsulates the state of a single form element in our form</a:t>
-            </a:r>
-            <a:endParaRPr lang="en-IN" sz="1200" cap="none" dirty="0">
-              <a:solidFill>
-                <a:srgbClr val="000000"/>
-              </a:solidFill>
-              <a:latin typeface="-apple-system"/>
-            </a:endParaRPr>
-          </a:p>
-          <a:p>
-            <a:pPr lvl="2"/>
-            <a:endParaRPr lang="en-IN" sz="1200" b="1" i="0" dirty="0">
-              <a:solidFill>
-                <a:srgbClr val="000000"/>
-              </a:solidFill>
-              <a:effectLst/>
-              <a:latin typeface="-apple-system"/>
-            </a:endParaRPr>
-          </a:p>
-          <a:p>
-            <a:pPr lvl="1"/>
-            <a:endParaRPr lang="en-IN" sz="1400" cap="none" dirty="0">
-              <a:solidFill>
-                <a:srgbClr val="000000"/>
-              </a:solidFill>
-              <a:latin typeface="-apple-system"/>
-            </a:endParaRPr>
-          </a:p>
-          <a:p>
-            <a:pPr marL="457200" lvl="1" indent="0">
-              <a:buNone/>
-            </a:pPr>
-            <a:endParaRPr lang="en-IN" sz="1600" cap="none" dirty="0">
-              <a:solidFill>
-                <a:srgbClr val="000000"/>
-              </a:solidFill>
-              <a:latin typeface="-apple-system"/>
-            </a:endParaRPr>
-          </a:p>
-        </p:txBody>
-      </p:sp>
+      </p:pic>
     </p:spTree>
     <p:extLst>
       <p:ext uri="{BB962C8B-B14F-4D97-AF65-F5344CB8AC3E}">

</xml_diff>

<commit_message>
added common use cases
</commit_message>
<xml_diff>
--- a/Reactive forms.pptx
+++ b/Reactive forms.pptx
@@ -17,6 +17,7 @@
     <p:sldId id="267" r:id="rId11"/>
     <p:sldId id="268" r:id="rId12"/>
     <p:sldId id="269" r:id="rId13"/>
+    <p:sldId id="270" r:id="rId14"/>
   </p:sldIdLst>
   <p:sldSz cx="12192000" cy="6858000"/>
   <p:notesSz cx="6858000" cy="9144000"/>
@@ -6477,6 +6478,118 @@
     <p:extLst>
       <p:ext uri="{BB962C8B-B14F-4D97-AF65-F5344CB8AC3E}">
         <p14:creationId xmlns:p14="http://schemas.microsoft.com/office/powerpoint/2010/main" val="1960932403"/>
+      </p:ext>
+    </p:extLst>
+  </p:cSld>
+  <p:clrMapOvr>
+    <a:masterClrMapping/>
+  </p:clrMapOvr>
+</p:sld>
+</file>
+
+<file path=ppt/slides/slide13.xml><?xml version="1.0" encoding="utf-8"?>
+<p:sld xmlns:a="http://schemas.openxmlformats.org/drawingml/2006/main" xmlns:r="http://schemas.openxmlformats.org/officeDocument/2006/relationships" xmlns:p="http://schemas.openxmlformats.org/presentationml/2006/main">
+  <p:cSld>
+    <p:spTree>
+      <p:nvGrpSpPr>
+        <p:cNvPr id="1" name=""/>
+        <p:cNvGrpSpPr/>
+        <p:nvPr/>
+      </p:nvGrpSpPr>
+      <p:grpSpPr>
+        <a:xfrm>
+          <a:off x="0" y="0"/>
+          <a:ext cx="0" cy="0"/>
+          <a:chOff x="0" y="0"/>
+          <a:chExt cx="0" cy="0"/>
+        </a:xfrm>
+      </p:grpSpPr>
+      <p:sp>
+        <p:nvSpPr>
+          <p:cNvPr id="2" name="Title 1">
+            <a:extLst>
+              <a:ext uri="{FF2B5EF4-FFF2-40B4-BE49-F238E27FC236}">
+                <a16:creationId xmlns:a16="http://schemas.microsoft.com/office/drawing/2014/main" id="{9B7F654B-C7FE-4F10-8020-6AC61054AD54}"/>
+              </a:ext>
+            </a:extLst>
+          </p:cNvPr>
+          <p:cNvSpPr>
+            <a:spLocks noGrp="1"/>
+          </p:cNvSpPr>
+          <p:nvPr>
+            <p:ph type="title"/>
+          </p:nvPr>
+        </p:nvSpPr>
+        <p:spPr/>
+        <p:txBody>
+          <a:bodyPr/>
+          <a:lstStyle/>
+          <a:p>
+            <a:r>
+              <a:rPr lang="en-US" b="1" dirty="0"/>
+              <a:t>Common use cases</a:t>
+            </a:r>
+            <a:endParaRPr lang="en-IN" b="1" dirty="0"/>
+          </a:p>
+        </p:txBody>
+      </p:sp>
+      <p:sp>
+        <p:nvSpPr>
+          <p:cNvPr id="3" name="Content Placeholder 2">
+            <a:extLst>
+              <a:ext uri="{FF2B5EF4-FFF2-40B4-BE49-F238E27FC236}">
+                <a16:creationId xmlns:a16="http://schemas.microsoft.com/office/drawing/2014/main" id="{B1728683-D708-4FB0-BCE4-658FC3587926}"/>
+              </a:ext>
+            </a:extLst>
+          </p:cNvPr>
+          <p:cNvSpPr>
+            <a:spLocks noGrp="1"/>
+          </p:cNvSpPr>
+          <p:nvPr>
+            <p:ph sz="quarter" idx="13"/>
+          </p:nvPr>
+        </p:nvSpPr>
+        <p:spPr/>
+        <p:txBody>
+          <a:bodyPr/>
+          <a:lstStyle/>
+          <a:p>
+            <a:r>
+              <a:rPr lang="en-US" dirty="0"/>
+              <a:t>Load form with default values</a:t>
+            </a:r>
+          </a:p>
+          <a:p>
+            <a:pPr lvl="1"/>
+            <a:r>
+              <a:rPr lang="en-US" dirty="0"/>
+              <a:t>Open saved forms</a:t>
+            </a:r>
+          </a:p>
+          <a:p>
+            <a:r>
+              <a:rPr lang="en-US" dirty="0"/>
+              <a:t>Get form control ref and set value</a:t>
+            </a:r>
+          </a:p>
+          <a:p>
+            <a:r>
+              <a:rPr lang="en-US" dirty="0"/>
+              <a:t>Reset the form</a:t>
+            </a:r>
+          </a:p>
+          <a:p>
+            <a:r>
+              <a:rPr lang="en-US" dirty="0"/>
+              <a:t>Listening to form value changes</a:t>
+            </a:r>
+          </a:p>
+        </p:txBody>
+      </p:sp>
+    </p:spTree>
+    <p:extLst>
+      <p:ext uri="{BB962C8B-B14F-4D97-AF65-F5344CB8AC3E}">
+        <p14:creationId xmlns:p14="http://schemas.microsoft.com/office/powerpoint/2010/main" val="4003189118"/>
       </p:ext>
     </p:extLst>
   </p:cSld>

</xml_diff>

<commit_message>
error messages and validation
</commit_message>
<xml_diff>
--- a/Reactive forms.pptx
+++ b/Reactive forms.pptx
@@ -18,6 +18,9 @@
     <p:sldId id="268" r:id="rId12"/>
     <p:sldId id="269" r:id="rId13"/>
     <p:sldId id="270" r:id="rId14"/>
+    <p:sldId id="271" r:id="rId15"/>
+    <p:sldId id="272" r:id="rId16"/>
+    <p:sldId id="273" r:id="rId17"/>
   </p:sldIdLst>
   <p:sldSz cx="12192000" cy="6858000"/>
   <p:notesSz cx="6858000" cy="9144000"/>
@@ -6584,12 +6587,355 @@
               <a:t>Listening to form value changes</a:t>
             </a:r>
           </a:p>
+          <a:p>
+            <a:r>
+              <a:rPr lang="en-US" dirty="0"/>
+              <a:t>Set value and patch values</a:t>
+            </a:r>
+          </a:p>
+          <a:p>
+            <a:pPr marL="0" indent="0">
+              <a:buNone/>
+            </a:pPr>
+            <a:endParaRPr lang="en-US" dirty="0"/>
+          </a:p>
         </p:txBody>
       </p:sp>
     </p:spTree>
     <p:extLst>
       <p:ext uri="{BB962C8B-B14F-4D97-AF65-F5344CB8AC3E}">
         <p14:creationId xmlns:p14="http://schemas.microsoft.com/office/powerpoint/2010/main" val="4003189118"/>
+      </p:ext>
+    </p:extLst>
+  </p:cSld>
+  <p:clrMapOvr>
+    <a:masterClrMapping/>
+  </p:clrMapOvr>
+</p:sld>
+</file>
+
+<file path=ppt/slides/slide14.xml><?xml version="1.0" encoding="utf-8"?>
+<p:sld xmlns:a="http://schemas.openxmlformats.org/drawingml/2006/main" xmlns:r="http://schemas.openxmlformats.org/officeDocument/2006/relationships" xmlns:p="http://schemas.openxmlformats.org/presentationml/2006/main">
+  <p:cSld>
+    <p:spTree>
+      <p:nvGrpSpPr>
+        <p:cNvPr id="1" name=""/>
+        <p:cNvGrpSpPr/>
+        <p:nvPr/>
+      </p:nvGrpSpPr>
+      <p:grpSpPr>
+        <a:xfrm>
+          <a:off x="0" y="0"/>
+          <a:ext cx="0" cy="0"/>
+          <a:chOff x="0" y="0"/>
+          <a:chExt cx="0" cy="0"/>
+        </a:xfrm>
+      </p:grpSpPr>
+      <p:sp>
+        <p:nvSpPr>
+          <p:cNvPr id="2" name="Title 1">
+            <a:extLst>
+              <a:ext uri="{FF2B5EF4-FFF2-40B4-BE49-F238E27FC236}">
+                <a16:creationId xmlns:a16="http://schemas.microsoft.com/office/drawing/2014/main" id="{61F80188-62E6-49FC-BD07-1C5AECF43445}"/>
+              </a:ext>
+            </a:extLst>
+          </p:cNvPr>
+          <p:cNvSpPr>
+            <a:spLocks noGrp="1"/>
+          </p:cNvSpPr>
+          <p:nvPr>
+            <p:ph type="title"/>
+          </p:nvPr>
+        </p:nvSpPr>
+        <p:spPr/>
+        <p:txBody>
+          <a:bodyPr/>
+          <a:lstStyle/>
+          <a:p>
+            <a:r>
+              <a:rPr lang="en-US" b="1" dirty="0"/>
+              <a:t>Validations</a:t>
+            </a:r>
+            <a:endParaRPr lang="en-IN" b="1" dirty="0"/>
+          </a:p>
+        </p:txBody>
+      </p:sp>
+      <p:sp>
+        <p:nvSpPr>
+          <p:cNvPr id="3" name="Content Placeholder 2">
+            <a:extLst>
+              <a:ext uri="{FF2B5EF4-FFF2-40B4-BE49-F238E27FC236}">
+                <a16:creationId xmlns:a16="http://schemas.microsoft.com/office/drawing/2014/main" id="{E7BF7C61-376C-4B09-9DF5-A8FE183C9147}"/>
+              </a:ext>
+            </a:extLst>
+          </p:cNvPr>
+          <p:cNvSpPr>
+            <a:spLocks noGrp="1"/>
+          </p:cNvSpPr>
+          <p:nvPr>
+            <p:ph sz="quarter" idx="13"/>
+          </p:nvPr>
+        </p:nvSpPr>
+        <p:spPr>
+          <a:xfrm>
+            <a:off x="913774" y="2367092"/>
+            <a:ext cx="1944836" cy="3424107"/>
+          </a:xfrm>
+        </p:spPr>
+        <p:txBody>
+          <a:bodyPr/>
+          <a:lstStyle/>
+          <a:p>
+            <a:r>
+              <a:rPr lang="en-US" dirty="0"/>
+              <a:t>REQUIRED</a:t>
+            </a:r>
+          </a:p>
+          <a:p>
+            <a:r>
+              <a:rPr lang="en-US" dirty="0" err="1"/>
+              <a:t>MINLENGth</a:t>
+            </a:r>
+            <a:endParaRPr lang="en-US" dirty="0"/>
+          </a:p>
+          <a:p>
+            <a:r>
+              <a:rPr lang="en-US" dirty="0" err="1"/>
+              <a:t>Maxlength</a:t>
+            </a:r>
+            <a:endParaRPr lang="en-US" dirty="0"/>
+          </a:p>
+          <a:p>
+            <a:r>
+              <a:rPr lang="en-US" dirty="0"/>
+              <a:t>Email</a:t>
+            </a:r>
+          </a:p>
+          <a:p>
+            <a:r>
+              <a:rPr lang="en-US" dirty="0"/>
+              <a:t>Pattern</a:t>
+            </a:r>
+          </a:p>
+          <a:p>
+            <a:pPr marL="0" indent="0">
+              <a:buNone/>
+            </a:pPr>
+            <a:endParaRPr lang="en-IN" dirty="0"/>
+          </a:p>
+        </p:txBody>
+      </p:sp>
+      <p:pic>
+        <p:nvPicPr>
+          <p:cNvPr id="7" name="Picture 6">
+            <a:extLst>
+              <a:ext uri="{FF2B5EF4-FFF2-40B4-BE49-F238E27FC236}">
+                <a16:creationId xmlns:a16="http://schemas.microsoft.com/office/drawing/2014/main" id="{E845FFF3-98F3-4860-8453-FCC2A7042B53}"/>
+              </a:ext>
+            </a:extLst>
+          </p:cNvPr>
+          <p:cNvPicPr>
+            <a:picLocks noChangeAspect="1"/>
+          </p:cNvPicPr>
+          <p:nvPr/>
+        </p:nvPicPr>
+        <p:blipFill>
+          <a:blip r:embed="rId2"/>
+          <a:stretch>
+            <a:fillRect/>
+          </a:stretch>
+        </p:blipFill>
+        <p:spPr>
+          <a:xfrm>
+            <a:off x="2681056" y="2279996"/>
+            <a:ext cx="9413289" cy="3029726"/>
+          </a:xfrm>
+          <a:prstGeom prst="rect">
+            <a:avLst/>
+          </a:prstGeom>
+        </p:spPr>
+      </p:pic>
+    </p:spTree>
+    <p:extLst>
+      <p:ext uri="{BB962C8B-B14F-4D97-AF65-F5344CB8AC3E}">
+        <p14:creationId xmlns:p14="http://schemas.microsoft.com/office/powerpoint/2010/main" val="3033631009"/>
+      </p:ext>
+    </p:extLst>
+  </p:cSld>
+  <p:clrMapOvr>
+    <a:masterClrMapping/>
+  </p:clrMapOvr>
+</p:sld>
+</file>
+
+<file path=ppt/slides/slide15.xml><?xml version="1.0" encoding="utf-8"?>
+<p:sld xmlns:a="http://schemas.openxmlformats.org/drawingml/2006/main" xmlns:r="http://schemas.openxmlformats.org/officeDocument/2006/relationships" xmlns:p="http://schemas.openxmlformats.org/presentationml/2006/main">
+  <p:cSld>
+    <p:spTree>
+      <p:nvGrpSpPr>
+        <p:cNvPr id="1" name=""/>
+        <p:cNvGrpSpPr/>
+        <p:nvPr/>
+      </p:nvGrpSpPr>
+      <p:grpSpPr>
+        <a:xfrm>
+          <a:off x="0" y="0"/>
+          <a:ext cx="0" cy="0"/>
+          <a:chOff x="0" y="0"/>
+          <a:chExt cx="0" cy="0"/>
+        </a:xfrm>
+      </p:grpSpPr>
+      <p:sp>
+        <p:nvSpPr>
+          <p:cNvPr id="2" name="Title 1">
+            <a:extLst>
+              <a:ext uri="{FF2B5EF4-FFF2-40B4-BE49-F238E27FC236}">
+                <a16:creationId xmlns:a16="http://schemas.microsoft.com/office/drawing/2014/main" id="{5C9EA953-C0CA-4980-820A-44AC47E0FB3A}"/>
+              </a:ext>
+            </a:extLst>
+          </p:cNvPr>
+          <p:cNvSpPr>
+            <a:spLocks noGrp="1"/>
+          </p:cNvSpPr>
+          <p:nvPr>
+            <p:ph type="title"/>
+          </p:nvPr>
+        </p:nvSpPr>
+        <p:spPr/>
+        <p:txBody>
+          <a:bodyPr/>
+          <a:lstStyle/>
+          <a:p>
+            <a:r>
+              <a:rPr lang="en-US" b="1" dirty="0"/>
+              <a:t>Show error Messages</a:t>
+            </a:r>
+            <a:endParaRPr lang="en-IN" b="1" dirty="0"/>
+          </a:p>
+        </p:txBody>
+      </p:sp>
+      <p:pic>
+        <p:nvPicPr>
+          <p:cNvPr id="5" name="Content Placeholder 4">
+            <a:extLst>
+              <a:ext uri="{FF2B5EF4-FFF2-40B4-BE49-F238E27FC236}">
+                <a16:creationId xmlns:a16="http://schemas.microsoft.com/office/drawing/2014/main" id="{ABF4E9C4-802B-4B88-B3B5-715D1340CC06}"/>
+              </a:ext>
+            </a:extLst>
+          </p:cNvPr>
+          <p:cNvPicPr>
+            <a:picLocks noGrp="1" noChangeAspect="1"/>
+          </p:cNvPicPr>
+          <p:nvPr>
+            <p:ph sz="quarter" idx="13"/>
+          </p:nvPr>
+        </p:nvPicPr>
+        <p:blipFill>
+          <a:blip r:embed="rId2"/>
+          <a:stretch>
+            <a:fillRect/>
+          </a:stretch>
+        </p:blipFill>
+        <p:spPr>
+          <a:xfrm>
+            <a:off x="914400" y="2506420"/>
+            <a:ext cx="10363200" cy="3145322"/>
+          </a:xfrm>
+        </p:spPr>
+      </p:pic>
+    </p:spTree>
+    <p:extLst>
+      <p:ext uri="{BB962C8B-B14F-4D97-AF65-F5344CB8AC3E}">
+        <p14:creationId xmlns:p14="http://schemas.microsoft.com/office/powerpoint/2010/main" val="4152499742"/>
+      </p:ext>
+    </p:extLst>
+  </p:cSld>
+  <p:clrMapOvr>
+    <a:masterClrMapping/>
+  </p:clrMapOvr>
+</p:sld>
+</file>
+
+<file path=ppt/slides/slide16.xml><?xml version="1.0" encoding="utf-8"?>
+<p:sld xmlns:a="http://schemas.openxmlformats.org/drawingml/2006/main" xmlns:r="http://schemas.openxmlformats.org/officeDocument/2006/relationships" xmlns:p="http://schemas.openxmlformats.org/presentationml/2006/main">
+  <p:cSld>
+    <p:spTree>
+      <p:nvGrpSpPr>
+        <p:cNvPr id="1" name=""/>
+        <p:cNvGrpSpPr/>
+        <p:nvPr/>
+      </p:nvGrpSpPr>
+      <p:grpSpPr>
+        <a:xfrm>
+          <a:off x="0" y="0"/>
+          <a:ext cx="0" cy="0"/>
+          <a:chOff x="0" y="0"/>
+          <a:chExt cx="0" cy="0"/>
+        </a:xfrm>
+      </p:grpSpPr>
+      <p:sp>
+        <p:nvSpPr>
+          <p:cNvPr id="2" name="Title 1">
+            <a:extLst>
+              <a:ext uri="{FF2B5EF4-FFF2-40B4-BE49-F238E27FC236}">
+                <a16:creationId xmlns:a16="http://schemas.microsoft.com/office/drawing/2014/main" id="{5C9EA953-C0CA-4980-820A-44AC47E0FB3A}"/>
+              </a:ext>
+            </a:extLst>
+          </p:cNvPr>
+          <p:cNvSpPr>
+            <a:spLocks noGrp="1"/>
+          </p:cNvSpPr>
+          <p:nvPr>
+            <p:ph type="title"/>
+          </p:nvPr>
+        </p:nvSpPr>
+        <p:spPr/>
+        <p:txBody>
+          <a:bodyPr/>
+          <a:lstStyle/>
+          <a:p>
+            <a:r>
+              <a:rPr lang="en-US" b="1" dirty="0"/>
+              <a:t>Show error only after filed touched</a:t>
+            </a:r>
+            <a:endParaRPr lang="en-IN" b="1" dirty="0"/>
+          </a:p>
+        </p:txBody>
+      </p:sp>
+      <p:pic>
+        <p:nvPicPr>
+          <p:cNvPr id="9" name="Picture 8">
+            <a:extLst>
+              <a:ext uri="{FF2B5EF4-FFF2-40B4-BE49-F238E27FC236}">
+                <a16:creationId xmlns:a16="http://schemas.microsoft.com/office/drawing/2014/main" id="{0A720D82-32EE-428D-BEC4-801BEB3A47FF}"/>
+              </a:ext>
+            </a:extLst>
+          </p:cNvPr>
+          <p:cNvPicPr>
+            <a:picLocks noChangeAspect="1"/>
+          </p:cNvPicPr>
+          <p:nvPr/>
+        </p:nvPicPr>
+        <p:blipFill>
+          <a:blip r:embed="rId2"/>
+          <a:stretch>
+            <a:fillRect/>
+          </a:stretch>
+        </p:blipFill>
+        <p:spPr>
+          <a:xfrm>
+            <a:off x="489474" y="2214694"/>
+            <a:ext cx="11372850" cy="3695700"/>
+          </a:xfrm>
+          <a:prstGeom prst="rect">
+            <a:avLst/>
+          </a:prstGeom>
+        </p:spPr>
+      </p:pic>
+    </p:spTree>
+    <p:extLst>
+      <p:ext uri="{BB962C8B-B14F-4D97-AF65-F5344CB8AC3E}">
+        <p14:creationId xmlns:p14="http://schemas.microsoft.com/office/powerpoint/2010/main" val="2720871085"/>
       </p:ext>
     </p:extLst>
   </p:cSld>

</xml_diff>

<commit_message>
updated ppt for custom controls
</commit_message>
<xml_diff>
--- a/Reactive forms.pptx
+++ b/Reactive forms.pptx
@@ -23,6 +23,8 @@
     <p:sldId id="275" r:id="rId17"/>
     <p:sldId id="273" r:id="rId18"/>
     <p:sldId id="274" r:id="rId19"/>
+    <p:sldId id="276" r:id="rId20"/>
+    <p:sldId id="277" r:id="rId21"/>
   </p:sldIdLst>
   <p:sldSz cx="12192000" cy="6858000"/>
   <p:notesSz cx="6858000" cy="9144000"/>
@@ -6897,10 +6899,10 @@
           <a:lstStyle/>
           <a:p>
             <a:r>
-              <a:rPr lang="en-US" dirty="0"/>
+              <a:rPr lang="en-US" b="1" u="sng" dirty="0"/>
               <a:t>From control properties</a:t>
             </a:r>
-            <a:endParaRPr lang="en-IN" dirty="0"/>
+            <a:endParaRPr lang="en-IN" b="1" u="sng" dirty="0"/>
           </a:p>
         </p:txBody>
       </p:sp>
@@ -7335,7 +7337,7 @@
         <p:spPr>
           <a:xfrm>
             <a:off x="5024761" y="5575177"/>
-            <a:ext cx="6498455" cy="646331"/>
+            <a:ext cx="6498455" cy="523220"/>
           </a:xfrm>
           <a:prstGeom prst="rect">
             <a:avLst/>
@@ -7349,7 +7351,7 @@
           <a:lstStyle/>
           <a:p>
             <a:r>
-              <a:rPr lang="en-IN" dirty="0"/>
+              <a:rPr lang="en-IN" sz="1400" dirty="0"/>
               <a:t>Source : https://stackoverflow.com/questions/25025102/angularjs-difference-between-pristine-dirty-and-touched-untouched</a:t>
             </a:r>
           </a:p>
@@ -7403,8 +7405,8 @@
         </p:nvSpPr>
         <p:spPr>
           <a:xfrm>
-            <a:off x="913771" y="0"/>
-            <a:ext cx="10364451" cy="1596177"/>
+            <a:off x="634438" y="-275208"/>
+            <a:ext cx="10923115" cy="1596177"/>
           </a:xfrm>
         </p:spPr>
         <p:txBody>
@@ -7413,7 +7415,7 @@
           <a:p>
             <a:r>
               <a:rPr lang="en-US" b="1" dirty="0"/>
-              <a:t>Show error only after filed touched</a:t>
+              <a:t>Show error only after field is touched/Dirty</a:t>
             </a:r>
             <a:endParaRPr lang="en-IN" b="1" dirty="0"/>
           </a:p>
@@ -7616,6 +7618,189 @@
 </p:sld>
 </file>
 
+<file path=ppt/slides/slide19.xml><?xml version="1.0" encoding="utf-8"?>
+<p:sld xmlns:a="http://schemas.openxmlformats.org/drawingml/2006/main" xmlns:r="http://schemas.openxmlformats.org/officeDocument/2006/relationships" xmlns:p="http://schemas.openxmlformats.org/presentationml/2006/main">
+  <p:cSld>
+    <p:spTree>
+      <p:nvGrpSpPr>
+        <p:cNvPr id="1" name=""/>
+        <p:cNvGrpSpPr/>
+        <p:nvPr/>
+      </p:nvGrpSpPr>
+      <p:grpSpPr>
+        <a:xfrm>
+          <a:off x="0" y="0"/>
+          <a:ext cx="0" cy="0"/>
+          <a:chOff x="0" y="0"/>
+          <a:chExt cx="0" cy="0"/>
+        </a:xfrm>
+      </p:grpSpPr>
+      <p:sp>
+        <p:nvSpPr>
+          <p:cNvPr id="2" name="Title 1">
+            <a:extLst>
+              <a:ext uri="{FF2B5EF4-FFF2-40B4-BE49-F238E27FC236}">
+                <a16:creationId xmlns:a16="http://schemas.microsoft.com/office/drawing/2014/main" id="{D5503537-20B1-4D8D-BF4E-DD15A563CC64}"/>
+              </a:ext>
+            </a:extLst>
+          </p:cNvPr>
+          <p:cNvSpPr>
+            <a:spLocks noGrp="1"/>
+          </p:cNvSpPr>
+          <p:nvPr>
+            <p:ph type="title"/>
+          </p:nvPr>
+        </p:nvSpPr>
+        <p:spPr/>
+        <p:txBody>
+          <a:bodyPr/>
+          <a:lstStyle/>
+          <a:p>
+            <a:r>
+              <a:rPr lang="en-US" dirty="0"/>
+              <a:t>Custom elements in form group</a:t>
+            </a:r>
+            <a:endParaRPr lang="en-IN" dirty="0"/>
+          </a:p>
+        </p:txBody>
+      </p:sp>
+      <p:sp>
+        <p:nvSpPr>
+          <p:cNvPr id="3" name="Content Placeholder 2">
+            <a:extLst>
+              <a:ext uri="{FF2B5EF4-FFF2-40B4-BE49-F238E27FC236}">
+                <a16:creationId xmlns:a16="http://schemas.microsoft.com/office/drawing/2014/main" id="{F322C878-5256-49FA-AA84-A2C2075C33C1}"/>
+              </a:ext>
+            </a:extLst>
+          </p:cNvPr>
+          <p:cNvSpPr>
+            <a:spLocks noGrp="1"/>
+          </p:cNvSpPr>
+          <p:nvPr>
+            <p:ph sz="quarter" idx="13"/>
+          </p:nvPr>
+        </p:nvSpPr>
+        <p:spPr/>
+        <p:txBody>
+          <a:bodyPr>
+            <a:normAutofit lnSpcReduction="10000"/>
+          </a:bodyPr>
+          <a:lstStyle/>
+          <a:p>
+            <a:r>
+              <a:rPr lang="en-US" dirty="0"/>
+              <a:t>CONTROL Value </a:t>
+            </a:r>
+            <a:r>
+              <a:rPr lang="en-IN" dirty="0"/>
+              <a:t>accessors</a:t>
+            </a:r>
+          </a:p>
+          <a:p>
+            <a:pPr lvl="1"/>
+            <a:r>
+              <a:rPr lang="en-US" sz="1600" b="0" i="0" dirty="0">
+                <a:effectLst/>
+                <a:latin typeface="Bahnschrift Light" panose="020B0502040204020203" pitchFamily="34" charset="0"/>
+              </a:rPr>
+              <a:t>under the hood, the Angular forms module is applying to each native HTML element a built-in Angular directive, which will be responsible for tracking the value of the field, and communicate it back to the parent form.</a:t>
+            </a:r>
+          </a:p>
+          <a:p>
+            <a:pPr lvl="1"/>
+            <a:r>
+              <a:rPr lang="en-US" sz="1600" dirty="0">
+                <a:latin typeface="Bahnschrift Light" panose="020B0502040204020203" pitchFamily="34" charset="0"/>
+              </a:rPr>
+              <a:t>These directive are called control value accessors</a:t>
+            </a:r>
+            <a:endParaRPr lang="en-IN" sz="1600" dirty="0">
+              <a:latin typeface="Bahnschrift Light" panose="020B0502040204020203" pitchFamily="34" charset="0"/>
+            </a:endParaRPr>
+          </a:p>
+          <a:p>
+            <a:r>
+              <a:rPr lang="en-US" dirty="0"/>
+              <a:t>Methods</a:t>
+            </a:r>
+          </a:p>
+          <a:p>
+            <a:pPr lvl="1"/>
+            <a:r>
+              <a:rPr lang="en-IN" sz="1600" dirty="0" err="1">
+                <a:latin typeface="Bahnschrift Light" panose="020B0502040204020203" pitchFamily="34" charset="0"/>
+              </a:rPr>
+              <a:t>writeValue</a:t>
+            </a:r>
+            <a:endParaRPr lang="en-US" sz="1600" dirty="0">
+              <a:latin typeface="Bahnschrift Light" panose="020B0502040204020203" pitchFamily="34" charset="0"/>
+            </a:endParaRPr>
+          </a:p>
+          <a:p>
+            <a:pPr lvl="1"/>
+            <a:r>
+              <a:rPr lang="en-IN" sz="1600" dirty="0" err="1">
+                <a:latin typeface="Bahnschrift Light" panose="020B0502040204020203" pitchFamily="34" charset="0"/>
+              </a:rPr>
+              <a:t>registerOnChange</a:t>
+            </a:r>
+            <a:endParaRPr lang="en-US" sz="1600" dirty="0">
+              <a:latin typeface="Bahnschrift Light" panose="020B0502040204020203" pitchFamily="34" charset="0"/>
+            </a:endParaRPr>
+          </a:p>
+          <a:p>
+            <a:pPr lvl="1"/>
+            <a:r>
+              <a:rPr lang="en-IN" sz="1600" dirty="0" err="1">
+                <a:latin typeface="Bahnschrift Light" panose="020B0502040204020203" pitchFamily="34" charset="0"/>
+              </a:rPr>
+              <a:t>registerOnTouched</a:t>
+            </a:r>
+            <a:endParaRPr lang="en-IN" sz="1600" dirty="0">
+              <a:latin typeface="Bahnschrift Light" panose="020B0502040204020203" pitchFamily="34" charset="0"/>
+            </a:endParaRPr>
+          </a:p>
+          <a:p>
+            <a:pPr lvl="1"/>
+            <a:r>
+              <a:rPr lang="en-IN" sz="1600" dirty="0" err="1">
+                <a:latin typeface="Bahnschrift Light" panose="020B0502040204020203" pitchFamily="34" charset="0"/>
+              </a:rPr>
+              <a:t>Setdisabledstate</a:t>
+            </a:r>
+            <a:endParaRPr lang="en-IN" sz="1600" dirty="0">
+              <a:latin typeface="Bahnschrift Light" panose="020B0502040204020203" pitchFamily="34" charset="0"/>
+            </a:endParaRPr>
+          </a:p>
+          <a:p>
+            <a:pPr marL="457200" lvl="1" indent="0">
+              <a:buNone/>
+            </a:pPr>
+            <a:endParaRPr lang="en-IN" sz="1600" dirty="0">
+              <a:latin typeface="Bahnschrift Light" panose="020B0502040204020203" pitchFamily="34" charset="0"/>
+            </a:endParaRPr>
+          </a:p>
+          <a:p>
+            <a:pPr marL="0" indent="0">
+              <a:buNone/>
+            </a:pPr>
+            <a:endParaRPr lang="en-IN" dirty="0"/>
+          </a:p>
+        </p:txBody>
+      </p:sp>
+    </p:spTree>
+    <p:extLst>
+      <p:ext uri="{BB962C8B-B14F-4D97-AF65-F5344CB8AC3E}">
+        <p14:creationId xmlns:p14="http://schemas.microsoft.com/office/powerpoint/2010/main" val="297264486"/>
+      </p:ext>
+    </p:extLst>
+  </p:cSld>
+  <p:clrMapOvr>
+    <a:masterClrMapping/>
+  </p:clrMapOvr>
+</p:sld>
+</file>
+
 <file path=ppt/slides/slide2.xml><?xml version="1.0" encoding="utf-8"?>
 <p:sld xmlns:a="http://schemas.openxmlformats.org/drawingml/2006/main" xmlns:r="http://schemas.openxmlformats.org/officeDocument/2006/relationships" xmlns:p="http://schemas.openxmlformats.org/presentationml/2006/main">
   <p:cSld>
@@ -7691,7 +7876,7 @@
                 <a:effectLst/>
                 <a:latin typeface="Verdana" panose="020B0604030504040204" pitchFamily="34" charset="0"/>
               </a:rPr>
-              <a:t>form Collection of user inputs and usually will be sent to Server</a:t>
+              <a:t>Collection of user inputs and usually will be sent to Server</a:t>
             </a:r>
           </a:p>
           <a:p>
@@ -8296,6 +8481,96 @@
 </p:sld>
 </file>
 
+<file path=ppt/slides/slide20.xml><?xml version="1.0" encoding="utf-8"?>
+<p:sld xmlns:a="http://schemas.openxmlformats.org/drawingml/2006/main" xmlns:r="http://schemas.openxmlformats.org/officeDocument/2006/relationships" xmlns:p="http://schemas.openxmlformats.org/presentationml/2006/main">
+  <p:cSld>
+    <p:spTree>
+      <p:nvGrpSpPr>
+        <p:cNvPr id="1" name=""/>
+        <p:cNvGrpSpPr/>
+        <p:nvPr/>
+      </p:nvGrpSpPr>
+      <p:grpSpPr>
+        <a:xfrm>
+          <a:off x="0" y="0"/>
+          <a:ext cx="0" cy="0"/>
+          <a:chOff x="0" y="0"/>
+          <a:chExt cx="0" cy="0"/>
+        </a:xfrm>
+      </p:grpSpPr>
+      <p:pic>
+        <p:nvPicPr>
+          <p:cNvPr id="5" name="Picture 4">
+            <a:extLst>
+              <a:ext uri="{FF2B5EF4-FFF2-40B4-BE49-F238E27FC236}">
+                <a16:creationId xmlns:a16="http://schemas.microsoft.com/office/drawing/2014/main" id="{43D5AB8D-DE91-4C1D-AA8C-EC5A47AAD260}"/>
+              </a:ext>
+            </a:extLst>
+          </p:cNvPr>
+          <p:cNvPicPr>
+            <a:picLocks noChangeAspect="1"/>
+          </p:cNvPicPr>
+          <p:nvPr/>
+        </p:nvPicPr>
+        <p:blipFill>
+          <a:blip r:embed="rId2"/>
+          <a:stretch>
+            <a:fillRect/>
+          </a:stretch>
+        </p:blipFill>
+        <p:spPr>
+          <a:xfrm>
+            <a:off x="134467" y="1571349"/>
+            <a:ext cx="5849083" cy="3559946"/>
+          </a:xfrm>
+          <a:prstGeom prst="rect">
+            <a:avLst/>
+          </a:prstGeom>
+        </p:spPr>
+      </p:pic>
+      <p:pic>
+        <p:nvPicPr>
+          <p:cNvPr id="7" name="Picture 6">
+            <a:extLst>
+              <a:ext uri="{FF2B5EF4-FFF2-40B4-BE49-F238E27FC236}">
+                <a16:creationId xmlns:a16="http://schemas.microsoft.com/office/drawing/2014/main" id="{A586FE58-3B3C-4286-B2FA-B2D8CAD10EC3}"/>
+              </a:ext>
+            </a:extLst>
+          </p:cNvPr>
+          <p:cNvPicPr>
+            <a:picLocks noChangeAspect="1"/>
+          </p:cNvPicPr>
+          <p:nvPr/>
+        </p:nvPicPr>
+        <p:blipFill>
+          <a:blip r:embed="rId3"/>
+          <a:stretch>
+            <a:fillRect/>
+          </a:stretch>
+        </p:blipFill>
+        <p:spPr>
+          <a:xfrm>
+            <a:off x="6096000" y="168674"/>
+            <a:ext cx="6013636" cy="6689325"/>
+          </a:xfrm>
+          <a:prstGeom prst="rect">
+            <a:avLst/>
+          </a:prstGeom>
+        </p:spPr>
+      </p:pic>
+    </p:spTree>
+    <p:extLst>
+      <p:ext uri="{BB962C8B-B14F-4D97-AF65-F5344CB8AC3E}">
+        <p14:creationId xmlns:p14="http://schemas.microsoft.com/office/powerpoint/2010/main" val="2947893555"/>
+      </p:ext>
+    </p:extLst>
+  </p:cSld>
+  <p:clrMapOvr>
+    <a:masterClrMapping/>
+  </p:clrMapOvr>
+</p:sld>
+</file>
+
 <file path=ppt/slides/slide3.xml><?xml version="1.0" encoding="utf-8"?>
 <p:sld xmlns:a="http://schemas.openxmlformats.org/drawingml/2006/main" xmlns:r="http://schemas.openxmlformats.org/officeDocument/2006/relationships" xmlns:p="http://schemas.openxmlformats.org/presentationml/2006/main">
   <p:cSld>
@@ -8336,7 +8611,7 @@
           <a:p>
             <a:r>
               <a:rPr lang="en-US" dirty="0"/>
-              <a:t>Key Concepts</a:t>
+              <a:t>Key elements</a:t>
             </a:r>
             <a:endParaRPr lang="en-IN" dirty="0"/>
           </a:p>
@@ -8366,15 +8641,21 @@
           <a:lstStyle/>
           <a:p>
             <a:r>
-              <a:rPr lang="en-US" b="0" i="0" dirty="0">
+              <a:rPr lang="en-US" dirty="0">
                 <a:solidFill>
                   <a:srgbClr val="000000"/>
                 </a:solidFill>
-                <a:effectLst/>
                 <a:latin typeface="Verdana" panose="020B0604030504040204" pitchFamily="34" charset="0"/>
               </a:rPr>
-              <a:t>Elements</a:t>
-            </a:r>
+              <a:t>controls</a:t>
+            </a:r>
+            <a:endParaRPr lang="en-US" b="0" i="0" dirty="0">
+              <a:solidFill>
+                <a:srgbClr val="000000"/>
+              </a:solidFill>
+              <a:effectLst/>
+              <a:latin typeface="Verdana" panose="020B0604030504040204" pitchFamily="34" charset="0"/>
+            </a:endParaRPr>
           </a:p>
           <a:p>
             <a:pPr lvl="1"/>
@@ -8627,33 +8908,112 @@
                                   </p:childTnLst>
                                 </p:cTn>
                               </p:par>
-                            </p:childTnLst>
-                          </p:cTn>
-                        </p:par>
-                      </p:childTnLst>
-                    </p:cTn>
-                  </p:par>
-                  <p:par>
-                    <p:cTn id="10" fill="hold">
-                      <p:stCondLst>
-                        <p:cond delay="indefinite"/>
-                      </p:stCondLst>
-                      <p:childTnLst>
-                        <p:par>
-                          <p:cTn id="11" fill="hold">
-                            <p:stCondLst>
-                              <p:cond delay="0"/>
-                            </p:stCondLst>
-                            <p:childTnLst>
                               <p:par>
-                                <p:cTn id="12" presetID="42" presetClass="entr" presetSubtype="0" fill="hold" nodeType="clickEffect">
+                                <p:cTn id="10" presetID="42" presetClass="entr" presetSubtype="0" fill="hold" nodeType="withEffect">
                                   <p:stCondLst>
                                     <p:cond delay="0"/>
                                   </p:stCondLst>
                                   <p:childTnLst>
                                     <p:set>
                                       <p:cBhvr>
-                                        <p:cTn id="13" dur="1" fill="hold">
+                                        <p:cTn id="11" dur="1" fill="hold">
+                                          <p:stCondLst>
+                                            <p:cond delay="0"/>
+                                          </p:stCondLst>
+                                        </p:cTn>
+                                        <p:tgtEl>
+                                          <p:spTgt spid="3">
+                                            <p:txEl>
+                                              <p:pRg st="1" end="1"/>
+                                            </p:txEl>
+                                          </p:spTgt>
+                                        </p:tgtEl>
+                                        <p:attrNameLst>
+                                          <p:attrName>style.visibility</p:attrName>
+                                        </p:attrNameLst>
+                                      </p:cBhvr>
+                                      <p:to>
+                                        <p:strVal val="visible"/>
+                                      </p:to>
+                                    </p:set>
+                                    <p:animEffect transition="in" filter="fade">
+                                      <p:cBhvr>
+                                        <p:cTn id="12" dur="1000"/>
+                                        <p:tgtEl>
+                                          <p:spTgt spid="3">
+                                            <p:txEl>
+                                              <p:pRg st="1" end="1"/>
+                                            </p:txEl>
+                                          </p:spTgt>
+                                        </p:tgtEl>
+                                      </p:cBhvr>
+                                    </p:animEffect>
+                                    <p:anim calcmode="lin" valueType="num">
+                                      <p:cBhvr>
+                                        <p:cTn id="13" dur="1000" fill="hold"/>
+                                        <p:tgtEl>
+                                          <p:spTgt spid="3">
+                                            <p:txEl>
+                                              <p:pRg st="1" end="1"/>
+                                            </p:txEl>
+                                          </p:spTgt>
+                                        </p:tgtEl>
+                                        <p:attrNameLst>
+                                          <p:attrName>ppt_x</p:attrName>
+                                        </p:attrNameLst>
+                                      </p:cBhvr>
+                                      <p:tavLst>
+                                        <p:tav tm="0">
+                                          <p:val>
+                                            <p:strVal val="#ppt_x"/>
+                                          </p:val>
+                                        </p:tav>
+                                        <p:tav tm="100000">
+                                          <p:val>
+                                            <p:strVal val="#ppt_x"/>
+                                          </p:val>
+                                        </p:tav>
+                                      </p:tavLst>
+                                    </p:anim>
+                                    <p:anim calcmode="lin" valueType="num">
+                                      <p:cBhvr>
+                                        <p:cTn id="14" dur="1000" fill="hold"/>
+                                        <p:tgtEl>
+                                          <p:spTgt spid="3">
+                                            <p:txEl>
+                                              <p:pRg st="1" end="1"/>
+                                            </p:txEl>
+                                          </p:spTgt>
+                                        </p:tgtEl>
+                                        <p:attrNameLst>
+                                          <p:attrName>ppt_y</p:attrName>
+                                        </p:attrNameLst>
+                                      </p:cBhvr>
+                                      <p:tavLst>
+                                        <p:tav tm="0">
+                                          <p:val>
+                                            <p:strVal val="#ppt_y+.1"/>
+                                          </p:val>
+                                        </p:tav>
+                                        <p:tav tm="100000">
+                                          <p:val>
+                                            <p:strVal val="#ppt_y"/>
+                                          </p:val>
+                                        </p:tav>
+                                      </p:tavLst>
+                                    </p:anim>
+                                  </p:childTnLst>
+                                </p:cTn>
+                              </p:par>
+                              <p:par>
+                                <p:cTn id="15" presetID="42" presetClass="entr" presetSubtype="0" fill="hold" nodeType="withEffect">
+                                  <p:stCondLst>
+                                    <p:cond delay="0"/>
+                                  </p:stCondLst>
+                                  <p:childTnLst>
+                                    <p:set>
+                                      <p:cBhvr>
+                                        <p:cTn id="16" dur="1" fill="hold">
                                           <p:stCondLst>
                                             <p:cond delay="0"/>
                                           </p:stCondLst>
@@ -8675,7 +9035,7 @@
                                     </p:set>
                                     <p:animEffect transition="in" filter="fade">
                                       <p:cBhvr>
-                                        <p:cTn id="14" dur="1000"/>
+                                        <p:cTn id="17" dur="1000"/>
                                         <p:tgtEl>
                                           <p:spTgt spid="3">
                                             <p:txEl>
@@ -8687,7 +9047,7 @@
                                     </p:animEffect>
                                     <p:anim calcmode="lin" valueType="num">
                                       <p:cBhvr>
-                                        <p:cTn id="15" dur="1000" fill="hold"/>
+                                        <p:cTn id="18" dur="1000" fill="hold"/>
                                         <p:tgtEl>
                                           <p:spTgt spid="3">
                                             <p:txEl>
@@ -8714,7 +9074,7 @@
                                     </p:anim>
                                     <p:anim calcmode="lin" valueType="num">
                                       <p:cBhvr>
-                                        <p:cTn id="16" dur="1000" fill="hold"/>
+                                        <p:cTn id="19" dur="1000" fill="hold"/>
                                         <p:tgtEl>
                                           <p:spTgt spid="3">
                                             <p:txEl>
@@ -8743,111 +9103,14 @@
                                 </p:cTn>
                               </p:par>
                               <p:par>
-                                <p:cTn id="17" presetID="42" presetClass="entr" presetSubtype="0" fill="hold" nodeType="withEffect">
+                                <p:cTn id="20" presetID="42" presetClass="entr" presetSubtype="0" fill="hold" nodeType="withEffect">
                                   <p:stCondLst>
                                     <p:cond delay="0"/>
                                   </p:stCondLst>
                                   <p:childTnLst>
                                     <p:set>
                                       <p:cBhvr>
-                                        <p:cTn id="18" dur="1" fill="hold">
-                                          <p:stCondLst>
-                                            <p:cond delay="0"/>
-                                          </p:stCondLst>
-                                        </p:cTn>
-                                        <p:tgtEl>
-                                          <p:spTgt spid="3">
-                                            <p:txEl>
-                                              <p:pRg st="1" end="1"/>
-                                            </p:txEl>
-                                          </p:spTgt>
-                                        </p:tgtEl>
-                                        <p:attrNameLst>
-                                          <p:attrName>style.visibility</p:attrName>
-                                        </p:attrNameLst>
-                                      </p:cBhvr>
-                                      <p:to>
-                                        <p:strVal val="visible"/>
-                                      </p:to>
-                                    </p:set>
-                                    <p:animEffect transition="in" filter="fade">
-                                      <p:cBhvr>
-                                        <p:cTn id="19" dur="1000"/>
-                                        <p:tgtEl>
-                                          <p:spTgt spid="3">
-                                            <p:txEl>
-                                              <p:pRg st="1" end="1"/>
-                                            </p:txEl>
-                                          </p:spTgt>
-                                        </p:tgtEl>
-                                      </p:cBhvr>
-                                    </p:animEffect>
-                                    <p:anim calcmode="lin" valueType="num">
-                                      <p:cBhvr>
-                                        <p:cTn id="20" dur="1000" fill="hold"/>
-                                        <p:tgtEl>
-                                          <p:spTgt spid="3">
-                                            <p:txEl>
-                                              <p:pRg st="1" end="1"/>
-                                            </p:txEl>
-                                          </p:spTgt>
-                                        </p:tgtEl>
-                                        <p:attrNameLst>
-                                          <p:attrName>ppt_x</p:attrName>
-                                        </p:attrNameLst>
-                                      </p:cBhvr>
-                                      <p:tavLst>
-                                        <p:tav tm="0">
-                                          <p:val>
-                                            <p:strVal val="#ppt_x"/>
-                                          </p:val>
-                                        </p:tav>
-                                        <p:tav tm="100000">
-                                          <p:val>
-                                            <p:strVal val="#ppt_x"/>
-                                          </p:val>
-                                        </p:tav>
-                                      </p:tavLst>
-                                    </p:anim>
-                                    <p:anim calcmode="lin" valueType="num">
-                                      <p:cBhvr>
-                                        <p:cTn id="21" dur="1000" fill="hold"/>
-                                        <p:tgtEl>
-                                          <p:spTgt spid="3">
-                                            <p:txEl>
-                                              <p:pRg st="1" end="1"/>
-                                            </p:txEl>
-                                          </p:spTgt>
-                                        </p:tgtEl>
-                                        <p:attrNameLst>
-                                          <p:attrName>ppt_y</p:attrName>
-                                        </p:attrNameLst>
-                                      </p:cBhvr>
-                                      <p:tavLst>
-                                        <p:tav tm="0">
-                                          <p:val>
-                                            <p:strVal val="#ppt_y+.1"/>
-                                          </p:val>
-                                        </p:tav>
-                                        <p:tav tm="100000">
-                                          <p:val>
-                                            <p:strVal val="#ppt_y"/>
-                                          </p:val>
-                                        </p:tav>
-                                      </p:tavLst>
-                                    </p:anim>
-                                  </p:childTnLst>
-                                </p:cTn>
-                              </p:par>
-                              <p:par>
-                                <p:cTn id="22" presetID="42" presetClass="entr" presetSubtype="0" fill="hold" nodeType="withEffect">
-                                  <p:stCondLst>
-                                    <p:cond delay="0"/>
-                                  </p:stCondLst>
-                                  <p:childTnLst>
-                                    <p:set>
-                                      <p:cBhvr>
-                                        <p:cTn id="23" dur="1" fill="hold">
+                                        <p:cTn id="21" dur="1" fill="hold">
                                           <p:stCondLst>
                                             <p:cond delay="0"/>
                                           </p:stCondLst>
@@ -8869,7 +9132,7 @@
                                     </p:set>
                                     <p:animEffect transition="in" filter="fade">
                                       <p:cBhvr>
-                                        <p:cTn id="24" dur="1000"/>
+                                        <p:cTn id="22" dur="1000"/>
                                         <p:tgtEl>
                                           <p:spTgt spid="3">
                                             <p:txEl>
@@ -8881,7 +9144,7 @@
                                     </p:animEffect>
                                     <p:anim calcmode="lin" valueType="num">
                                       <p:cBhvr>
-                                        <p:cTn id="25" dur="1000" fill="hold"/>
+                                        <p:cTn id="23" dur="1000" fill="hold"/>
                                         <p:tgtEl>
                                           <p:spTgt spid="3">
                                             <p:txEl>
@@ -8908,7 +9171,7 @@
                                     </p:anim>
                                     <p:anim calcmode="lin" valueType="num">
                                       <p:cBhvr>
-                                        <p:cTn id="26" dur="1000" fill="hold"/>
+                                        <p:cTn id="24" dur="1000" fill="hold"/>
                                         <p:tgtEl>
                                           <p:spTgt spid="3">
                                             <p:txEl>
@@ -8937,14 +9200,14 @@
                                 </p:cTn>
                               </p:par>
                               <p:par>
-                                <p:cTn id="27" presetID="42" presetClass="entr" presetSubtype="0" fill="hold" nodeType="withEffect">
+                                <p:cTn id="25" presetID="42" presetClass="entr" presetSubtype="0" fill="hold" nodeType="withEffect">
                                   <p:stCondLst>
                                     <p:cond delay="0"/>
                                   </p:stCondLst>
                                   <p:childTnLst>
                                     <p:set>
                                       <p:cBhvr>
-                                        <p:cTn id="28" dur="1" fill="hold">
+                                        <p:cTn id="26" dur="1" fill="hold">
                                           <p:stCondLst>
                                             <p:cond delay="0"/>
                                           </p:stCondLst>
@@ -8966,7 +9229,7 @@
                                     </p:set>
                                     <p:animEffect transition="in" filter="fade">
                                       <p:cBhvr>
-                                        <p:cTn id="29" dur="1000"/>
+                                        <p:cTn id="27" dur="1000"/>
                                         <p:tgtEl>
                                           <p:spTgt spid="3">
                                             <p:txEl>
@@ -8978,7 +9241,7 @@
                                     </p:animEffect>
                                     <p:anim calcmode="lin" valueType="num">
                                       <p:cBhvr>
-                                        <p:cTn id="30" dur="1000" fill="hold"/>
+                                        <p:cTn id="28" dur="1000" fill="hold"/>
                                         <p:tgtEl>
                                           <p:spTgt spid="3">
                                             <p:txEl>
@@ -9005,7 +9268,7 @@
                                     </p:anim>
                                     <p:anim calcmode="lin" valueType="num">
                                       <p:cBhvr>
-                                        <p:cTn id="31" dur="1000" fill="hold"/>
+                                        <p:cTn id="29" dur="1000" fill="hold"/>
                                         <p:tgtEl>
                                           <p:spTgt spid="3">
                                             <p:txEl>
@@ -9034,14 +9297,14 @@
                                 </p:cTn>
                               </p:par>
                               <p:par>
-                                <p:cTn id="32" presetID="42" presetClass="entr" presetSubtype="0" fill="hold" nodeType="withEffect">
+                                <p:cTn id="30" presetID="42" presetClass="entr" presetSubtype="0" fill="hold" nodeType="withEffect">
                                   <p:stCondLst>
                                     <p:cond delay="0"/>
                                   </p:stCondLst>
                                   <p:childTnLst>
                                     <p:set>
                                       <p:cBhvr>
-                                        <p:cTn id="33" dur="1" fill="hold">
+                                        <p:cTn id="31" dur="1" fill="hold">
                                           <p:stCondLst>
                                             <p:cond delay="0"/>
                                           </p:stCondLst>
@@ -9063,7 +9326,7 @@
                                     </p:set>
                                     <p:animEffect transition="in" filter="fade">
                                       <p:cBhvr>
-                                        <p:cTn id="34" dur="1000"/>
+                                        <p:cTn id="32" dur="1000"/>
                                         <p:tgtEl>
                                           <p:spTgt spid="3">
                                             <p:txEl>
@@ -9075,7 +9338,7 @@
                                     </p:animEffect>
                                     <p:anim calcmode="lin" valueType="num">
                                       <p:cBhvr>
-                                        <p:cTn id="35" dur="1000" fill="hold"/>
+                                        <p:cTn id="33" dur="1000" fill="hold"/>
                                         <p:tgtEl>
                                           <p:spTgt spid="3">
                                             <p:txEl>
@@ -9102,7 +9365,7 @@
                                     </p:anim>
                                     <p:anim calcmode="lin" valueType="num">
                                       <p:cBhvr>
-                                        <p:cTn id="36" dur="1000" fill="hold"/>
+                                        <p:cTn id="34" dur="1000" fill="hold"/>
                                         <p:tgtEl>
                                           <p:spTgt spid="3">
                                             <p:txEl>
@@ -9131,14 +9394,14 @@
                                 </p:cTn>
                               </p:par>
                               <p:par>
-                                <p:cTn id="37" presetID="42" presetClass="entr" presetSubtype="0" fill="hold" nodeType="withEffect">
+                                <p:cTn id="35" presetID="42" presetClass="entr" presetSubtype="0" fill="hold" nodeType="withEffect">
                                   <p:stCondLst>
                                     <p:cond delay="0"/>
                                   </p:stCondLst>
                                   <p:childTnLst>
                                     <p:set>
                                       <p:cBhvr>
-                                        <p:cTn id="38" dur="1" fill="hold">
+                                        <p:cTn id="36" dur="1" fill="hold">
                                           <p:stCondLst>
                                             <p:cond delay="0"/>
                                           </p:stCondLst>
@@ -9160,7 +9423,7 @@
                                     </p:set>
                                     <p:animEffect transition="in" filter="fade">
                                       <p:cBhvr>
-                                        <p:cTn id="39" dur="1000"/>
+                                        <p:cTn id="37" dur="1000"/>
                                         <p:tgtEl>
                                           <p:spTgt spid="3">
                                             <p:txEl>
@@ -9172,7 +9435,7 @@
                                     </p:animEffect>
                                     <p:anim calcmode="lin" valueType="num">
                                       <p:cBhvr>
-                                        <p:cTn id="40" dur="1000" fill="hold"/>
+                                        <p:cTn id="38" dur="1000" fill="hold"/>
                                         <p:tgtEl>
                                           <p:spTgt spid="3">
                                             <p:txEl>
@@ -9199,7 +9462,7 @@
                                     </p:anim>
                                     <p:anim calcmode="lin" valueType="num">
                                       <p:cBhvr>
-                                        <p:cTn id="41" dur="1000" fill="hold"/>
+                                        <p:cTn id="39" dur="1000" fill="hold"/>
                                         <p:tgtEl>
                                           <p:spTgt spid="3">
                                             <p:txEl>
@@ -9228,14 +9491,14 @@
                                 </p:cTn>
                               </p:par>
                               <p:par>
-                                <p:cTn id="42" presetID="42" presetClass="entr" presetSubtype="0" fill="hold" nodeType="withEffect">
+                                <p:cTn id="40" presetID="42" presetClass="entr" presetSubtype="0" fill="hold" nodeType="withEffect">
                                   <p:stCondLst>
                                     <p:cond delay="0"/>
                                   </p:stCondLst>
                                   <p:childTnLst>
                                     <p:set>
                                       <p:cBhvr>
-                                        <p:cTn id="43" dur="1" fill="hold">
+                                        <p:cTn id="41" dur="1" fill="hold">
                                           <p:stCondLst>
                                             <p:cond delay="0"/>
                                           </p:stCondLst>
@@ -9257,7 +9520,7 @@
                                     </p:set>
                                     <p:animEffect transition="in" filter="fade">
                                       <p:cBhvr>
-                                        <p:cTn id="44" dur="1000"/>
+                                        <p:cTn id="42" dur="1000"/>
                                         <p:tgtEl>
                                           <p:spTgt spid="3">
                                             <p:txEl>
@@ -9269,7 +9532,7 @@
                                     </p:animEffect>
                                     <p:anim calcmode="lin" valueType="num">
                                       <p:cBhvr>
-                                        <p:cTn id="45" dur="1000" fill="hold"/>
+                                        <p:cTn id="43" dur="1000" fill="hold"/>
                                         <p:tgtEl>
                                           <p:spTgt spid="3">
                                             <p:txEl>
@@ -9296,7 +9559,7 @@
                                     </p:anim>
                                     <p:anim calcmode="lin" valueType="num">
                                       <p:cBhvr>
-                                        <p:cTn id="46" dur="1000" fill="hold"/>
+                                        <p:cTn id="44" dur="1000" fill="hold"/>
                                         <p:tgtEl>
                                           <p:spTgt spid="3">
                                             <p:txEl>
@@ -9331,26 +9594,26 @@
                     </p:cTn>
                   </p:par>
                   <p:par>
-                    <p:cTn id="47" fill="hold">
+                    <p:cTn id="45" fill="hold">
                       <p:stCondLst>
                         <p:cond delay="indefinite"/>
                       </p:stCondLst>
                       <p:childTnLst>
                         <p:par>
-                          <p:cTn id="48" fill="hold">
+                          <p:cTn id="46" fill="hold">
                             <p:stCondLst>
                               <p:cond delay="0"/>
                             </p:stCondLst>
                             <p:childTnLst>
                               <p:par>
-                                <p:cTn id="49" presetID="42" presetClass="entr" presetSubtype="0" fill="hold" nodeType="clickEffect">
+                                <p:cTn id="47" presetID="42" presetClass="entr" presetSubtype="0" fill="hold" nodeType="clickEffect">
                                   <p:stCondLst>
                                     <p:cond delay="0"/>
                                   </p:stCondLst>
                                   <p:childTnLst>
                                     <p:set>
                                       <p:cBhvr>
-                                        <p:cTn id="50" dur="1" fill="hold">
+                                        <p:cTn id="48" dur="1" fill="hold">
                                           <p:stCondLst>
                                             <p:cond delay="0"/>
                                           </p:stCondLst>
@@ -9372,7 +9635,7 @@
                                     </p:set>
                                     <p:animEffect transition="in" filter="fade">
                                       <p:cBhvr>
-                                        <p:cTn id="51" dur="1000"/>
+                                        <p:cTn id="49" dur="1000"/>
                                         <p:tgtEl>
                                           <p:spTgt spid="3">
                                             <p:txEl>
@@ -9384,7 +9647,7 @@
                                     </p:animEffect>
                                     <p:anim calcmode="lin" valueType="num">
                                       <p:cBhvr>
-                                        <p:cTn id="52" dur="1000" fill="hold"/>
+                                        <p:cTn id="50" dur="1000" fill="hold"/>
                                         <p:tgtEl>
                                           <p:spTgt spid="3">
                                             <p:txEl>
@@ -9411,7 +9674,7 @@
                                     </p:anim>
                                     <p:anim calcmode="lin" valueType="num">
                                       <p:cBhvr>
-                                        <p:cTn id="53" dur="1000" fill="hold"/>
+                                        <p:cTn id="51" dur="1000" fill="hold"/>
                                         <p:tgtEl>
                                           <p:spTgt spid="3">
                                             <p:txEl>
@@ -9440,14 +9703,14 @@
                                 </p:cTn>
                               </p:par>
                               <p:par>
-                                <p:cTn id="54" presetID="42" presetClass="entr" presetSubtype="0" fill="hold" nodeType="withEffect">
+                                <p:cTn id="52" presetID="42" presetClass="entr" presetSubtype="0" fill="hold" nodeType="withEffect">
                                   <p:stCondLst>
                                     <p:cond delay="0"/>
                                   </p:stCondLst>
                                   <p:childTnLst>
                                     <p:set>
                                       <p:cBhvr>
-                                        <p:cTn id="55" dur="1" fill="hold">
+                                        <p:cTn id="53" dur="1" fill="hold">
                                           <p:stCondLst>
                                             <p:cond delay="0"/>
                                           </p:stCondLst>
@@ -9469,7 +9732,7 @@
                                     </p:set>
                                     <p:animEffect transition="in" filter="fade">
                                       <p:cBhvr>
-                                        <p:cTn id="56" dur="1000"/>
+                                        <p:cTn id="54" dur="1000"/>
                                         <p:tgtEl>
                                           <p:spTgt spid="3">
                                             <p:txEl>
@@ -9481,7 +9744,7 @@
                                     </p:animEffect>
                                     <p:anim calcmode="lin" valueType="num">
                                       <p:cBhvr>
-                                        <p:cTn id="57" dur="1000" fill="hold"/>
+                                        <p:cTn id="55" dur="1000" fill="hold"/>
                                         <p:tgtEl>
                                           <p:spTgt spid="3">
                                             <p:txEl>
@@ -9508,7 +9771,7 @@
                                     </p:anim>
                                     <p:anim calcmode="lin" valueType="num">
                                       <p:cBhvr>
-                                        <p:cTn id="58" dur="1000" fill="hold"/>
+                                        <p:cTn id="56" dur="1000" fill="hold"/>
                                         <p:tgtEl>
                                           <p:spTgt spid="3">
                                             <p:txEl>
@@ -9537,14 +9800,14 @@
                                 </p:cTn>
                               </p:par>
                               <p:par>
-                                <p:cTn id="59" presetID="42" presetClass="entr" presetSubtype="0" fill="hold" nodeType="withEffect">
+                                <p:cTn id="57" presetID="42" presetClass="entr" presetSubtype="0" fill="hold" nodeType="withEffect">
                                   <p:stCondLst>
                                     <p:cond delay="0"/>
                                   </p:stCondLst>
                                   <p:childTnLst>
                                     <p:set>
                                       <p:cBhvr>
-                                        <p:cTn id="60" dur="1" fill="hold">
+                                        <p:cTn id="58" dur="1" fill="hold">
                                           <p:stCondLst>
                                             <p:cond delay="0"/>
                                           </p:stCondLst>
@@ -9566,7 +9829,7 @@
                                     </p:set>
                                     <p:animEffect transition="in" filter="fade">
                                       <p:cBhvr>
-                                        <p:cTn id="61" dur="1000"/>
+                                        <p:cTn id="59" dur="1000"/>
                                         <p:tgtEl>
                                           <p:spTgt spid="3">
                                             <p:txEl>
@@ -9578,7 +9841,7 @@
                                     </p:animEffect>
                                     <p:anim calcmode="lin" valueType="num">
                                       <p:cBhvr>
-                                        <p:cTn id="62" dur="1000" fill="hold"/>
+                                        <p:cTn id="60" dur="1000" fill="hold"/>
                                         <p:tgtEl>
                                           <p:spTgt spid="3">
                                             <p:txEl>
@@ -9605,7 +9868,7 @@
                                     </p:anim>
                                     <p:anim calcmode="lin" valueType="num">
                                       <p:cBhvr>
-                                        <p:cTn id="63" dur="1000" fill="hold"/>
+                                        <p:cTn id="61" dur="1000" fill="hold"/>
                                         <p:tgtEl>
                                           <p:spTgt spid="3">
                                             <p:txEl>
@@ -9634,14 +9897,14 @@
                                 </p:cTn>
                               </p:par>
                               <p:par>
-                                <p:cTn id="64" presetID="42" presetClass="entr" presetSubtype="0" fill="hold" nodeType="withEffect">
+                                <p:cTn id="62" presetID="42" presetClass="entr" presetSubtype="0" fill="hold" nodeType="withEffect">
                                   <p:stCondLst>
                                     <p:cond delay="0"/>
                                   </p:stCondLst>
                                   <p:childTnLst>
                                     <p:set>
                                       <p:cBhvr>
-                                        <p:cTn id="65" dur="1" fill="hold">
+                                        <p:cTn id="63" dur="1" fill="hold">
                                           <p:stCondLst>
                                             <p:cond delay="0"/>
                                           </p:stCondLst>
@@ -9663,7 +9926,7 @@
                                     </p:set>
                                     <p:animEffect transition="in" filter="fade">
                                       <p:cBhvr>
-                                        <p:cTn id="66" dur="1000"/>
+                                        <p:cTn id="64" dur="1000"/>
                                         <p:tgtEl>
                                           <p:spTgt spid="3">
                                             <p:txEl>
@@ -9675,7 +9938,7 @@
                                     </p:animEffect>
                                     <p:anim calcmode="lin" valueType="num">
                                       <p:cBhvr>
-                                        <p:cTn id="67" dur="1000" fill="hold"/>
+                                        <p:cTn id="65" dur="1000" fill="hold"/>
                                         <p:tgtEl>
                                           <p:spTgt spid="3">
                                             <p:txEl>
@@ -9702,7 +9965,7 @@
                                     </p:anim>
                                     <p:anim calcmode="lin" valueType="num">
                                       <p:cBhvr>
-                                        <p:cTn id="68" dur="1000" fill="hold"/>
+                                        <p:cTn id="66" dur="1000" fill="hold"/>
                                         <p:tgtEl>
                                           <p:spTgt spid="3">
                                             <p:txEl>

</xml_diff>